<commit_message>
changed the size of the powerpoint slides such that the final image does not have some much empty space on the edges
</commit_message>
<xml_diff>
--- a/SIR model diagram.pptx
+++ b/SIR model diagram.pptx
@@ -2,18 +2,18 @@
 <file path=ppt/presentation.xml><?xml version="1.0" encoding="utf-8"?>
 <p:presentation xmlns:a="http://schemas.openxmlformats.org/drawingml/2006/main" xmlns:r="http://schemas.openxmlformats.org/officeDocument/2006/relationships" xmlns:p="http://schemas.openxmlformats.org/presentationml/2006/main" saveSubsetFonts="1">
   <p:sldMasterIdLst>
-    <p:sldMasterId id="2147483648" r:id="rId1"/>
+    <p:sldMasterId id="2147483672" r:id="rId1"/>
   </p:sldMasterIdLst>
   <p:sldIdLst>
     <p:sldId id="256" r:id="rId2"/>
   </p:sldIdLst>
-  <p:sldSz cx="12192000" cy="6858000"/>
+  <p:sldSz cx="8999538" cy="2160588"/>
   <p:notesSz cx="6858000" cy="9144000"/>
   <p:defaultTextStyle>
     <a:defPPr>
-      <a:defRPr lang="nl-NL"/>
+      <a:defRPr lang="en-US"/>
     </a:defPPr>
-    <a:lvl1pPr marL="0" algn="l" defTabSz="914400" rtl="0" eaLnBrk="1" latinLnBrk="0" hangingPunct="1">
+    <a:lvl1pPr marL="0" algn="l" defTabSz="457200" rtl="0" eaLnBrk="1" latinLnBrk="0" hangingPunct="1">
       <a:defRPr sz="1800" kern="1200">
         <a:solidFill>
           <a:schemeClr val="tx1"/>
@@ -23,7 +23,7 @@
         <a:cs typeface="+mn-cs"/>
       </a:defRPr>
     </a:lvl1pPr>
-    <a:lvl2pPr marL="457200" algn="l" defTabSz="914400" rtl="0" eaLnBrk="1" latinLnBrk="0" hangingPunct="1">
+    <a:lvl2pPr marL="457200" algn="l" defTabSz="457200" rtl="0" eaLnBrk="1" latinLnBrk="0" hangingPunct="1">
       <a:defRPr sz="1800" kern="1200">
         <a:solidFill>
           <a:schemeClr val="tx1"/>
@@ -33,7 +33,7 @@
         <a:cs typeface="+mn-cs"/>
       </a:defRPr>
     </a:lvl2pPr>
-    <a:lvl3pPr marL="914400" algn="l" defTabSz="914400" rtl="0" eaLnBrk="1" latinLnBrk="0" hangingPunct="1">
+    <a:lvl3pPr marL="914400" algn="l" defTabSz="457200" rtl="0" eaLnBrk="1" latinLnBrk="0" hangingPunct="1">
       <a:defRPr sz="1800" kern="1200">
         <a:solidFill>
           <a:schemeClr val="tx1"/>
@@ -43,7 +43,7 @@
         <a:cs typeface="+mn-cs"/>
       </a:defRPr>
     </a:lvl3pPr>
-    <a:lvl4pPr marL="1371600" algn="l" defTabSz="914400" rtl="0" eaLnBrk="1" latinLnBrk="0" hangingPunct="1">
+    <a:lvl4pPr marL="1371600" algn="l" defTabSz="457200" rtl="0" eaLnBrk="1" latinLnBrk="0" hangingPunct="1">
       <a:defRPr sz="1800" kern="1200">
         <a:solidFill>
           <a:schemeClr val="tx1"/>
@@ -53,7 +53,7 @@
         <a:cs typeface="+mn-cs"/>
       </a:defRPr>
     </a:lvl4pPr>
-    <a:lvl5pPr marL="1828800" algn="l" defTabSz="914400" rtl="0" eaLnBrk="1" latinLnBrk="0" hangingPunct="1">
+    <a:lvl5pPr marL="1828800" algn="l" defTabSz="457200" rtl="0" eaLnBrk="1" latinLnBrk="0" hangingPunct="1">
       <a:defRPr sz="1800" kern="1200">
         <a:solidFill>
           <a:schemeClr val="tx1"/>
@@ -63,7 +63,7 @@
         <a:cs typeface="+mn-cs"/>
       </a:defRPr>
     </a:lvl5pPr>
-    <a:lvl6pPr marL="2286000" algn="l" defTabSz="914400" rtl="0" eaLnBrk="1" latinLnBrk="0" hangingPunct="1">
+    <a:lvl6pPr marL="2286000" algn="l" defTabSz="457200" rtl="0" eaLnBrk="1" latinLnBrk="0" hangingPunct="1">
       <a:defRPr sz="1800" kern="1200">
         <a:solidFill>
           <a:schemeClr val="tx1"/>
@@ -73,7 +73,7 @@
         <a:cs typeface="+mn-cs"/>
       </a:defRPr>
     </a:lvl6pPr>
-    <a:lvl7pPr marL="2743200" algn="l" defTabSz="914400" rtl="0" eaLnBrk="1" latinLnBrk="0" hangingPunct="1">
+    <a:lvl7pPr marL="2743200" algn="l" defTabSz="457200" rtl="0" eaLnBrk="1" latinLnBrk="0" hangingPunct="1">
       <a:defRPr sz="1800" kern="1200">
         <a:solidFill>
           <a:schemeClr val="tx1"/>
@@ -83,7 +83,7 @@
         <a:cs typeface="+mn-cs"/>
       </a:defRPr>
     </a:lvl7pPr>
-    <a:lvl8pPr marL="3200400" algn="l" defTabSz="914400" rtl="0" eaLnBrk="1" latinLnBrk="0" hangingPunct="1">
+    <a:lvl8pPr marL="3200400" algn="l" defTabSz="457200" rtl="0" eaLnBrk="1" latinLnBrk="0" hangingPunct="1">
       <a:defRPr sz="1800" kern="1200">
         <a:solidFill>
           <a:schemeClr val="tx1"/>
@@ -93,7 +93,7 @@
         <a:cs typeface="+mn-cs"/>
       </a:defRPr>
     </a:lvl8pPr>
-    <a:lvl9pPr marL="3657600" algn="l" defTabSz="914400" rtl="0" eaLnBrk="1" latinLnBrk="0" hangingPunct="1">
+    <a:lvl9pPr marL="3657600" algn="l" defTabSz="457200" rtl="0" eaLnBrk="1" latinLnBrk="0" hangingPunct="1">
       <a:defRPr sz="1800" kern="1200">
         <a:solidFill>
           <a:schemeClr val="tx1"/>
@@ -104,7 +104,347 @@
       </a:defRPr>
     </a:lvl9pPr>
   </p:defaultTextStyle>
+  <p:extLst>
+    <p:ext uri="{EFAFB233-063F-42B5-8137-9DF3F51BA10A}">
+      <p15:sldGuideLst xmlns:p15="http://schemas.microsoft.com/office/powerpoint/2012/main"/>
+    </p:ext>
+  </p:extLst>
 </p:presentation>
+</file>
+
+<file path=ppt/changesInfos/changesInfo1.xml><?xml version="1.0" encoding="utf-8"?>
+<pc:chgInfo xmlns:a="http://schemas.openxmlformats.org/drawingml/2006/main" xmlns:r="http://schemas.openxmlformats.org/officeDocument/2006/relationships" xmlns:ac="http://schemas.microsoft.com/office/drawing/2013/main/command" xmlns:pc="http://schemas.microsoft.com/office/powerpoint/2013/main/command">
+  <pc:docChgLst>
+    <pc:chgData name="Chen, David" userId="ca743ca0-a026-471f-bfdf-cc601ae2aa9d" providerId="ADAL" clId="{928448AA-3330-4A68-B58C-1B39F98300F1}"/>
+    <pc:docChg chg="modSld modMainMaster">
+      <pc:chgData name="Chen, David" userId="ca743ca0-a026-471f-bfdf-cc601ae2aa9d" providerId="ADAL" clId="{928448AA-3330-4A68-B58C-1B39F98300F1}" dt="2023-02-28T13:09:32.636" v="1" actId="1076"/>
+      <pc:docMkLst>
+        <pc:docMk/>
+      </pc:docMkLst>
+      <pc:sldChg chg="modSp mod">
+        <pc:chgData name="Chen, David" userId="ca743ca0-a026-471f-bfdf-cc601ae2aa9d" providerId="ADAL" clId="{928448AA-3330-4A68-B58C-1B39F98300F1}" dt="2023-02-28T13:09:32.636" v="1" actId="1076"/>
+        <pc:sldMkLst>
+          <pc:docMk/>
+          <pc:sldMk cId="3188284111" sldId="256"/>
+        </pc:sldMkLst>
+        <pc:spChg chg="mod">
+          <ac:chgData name="Chen, David" userId="ca743ca0-a026-471f-bfdf-cc601ae2aa9d" providerId="ADAL" clId="{928448AA-3330-4A68-B58C-1B39F98300F1}" dt="2023-02-28T13:09:32.636" v="1" actId="1076"/>
+          <ac:spMkLst>
+            <pc:docMk/>
+            <pc:sldMk cId="3188284111" sldId="256"/>
+            <ac:spMk id="5" creationId="{B5815027-A8B0-DBE0-E1D1-A61F80CFC11E}"/>
+          </ac:spMkLst>
+        </pc:spChg>
+        <pc:spChg chg="mod">
+          <ac:chgData name="Chen, David" userId="ca743ca0-a026-471f-bfdf-cc601ae2aa9d" providerId="ADAL" clId="{928448AA-3330-4A68-B58C-1B39F98300F1}" dt="2023-02-28T13:09:32.636" v="1" actId="1076"/>
+          <ac:spMkLst>
+            <pc:docMk/>
+            <pc:sldMk cId="3188284111" sldId="256"/>
+            <ac:spMk id="6" creationId="{7AE8DD46-7DC0-58D5-14D3-91E1355EF666}"/>
+          </ac:spMkLst>
+        </pc:spChg>
+        <pc:spChg chg="mod">
+          <ac:chgData name="Chen, David" userId="ca743ca0-a026-471f-bfdf-cc601ae2aa9d" providerId="ADAL" clId="{928448AA-3330-4A68-B58C-1B39F98300F1}" dt="2023-02-28T13:09:32.636" v="1" actId="1076"/>
+          <ac:spMkLst>
+            <pc:docMk/>
+            <pc:sldMk cId="3188284111" sldId="256"/>
+            <ac:spMk id="7" creationId="{831BEC39-EFB7-F18A-9DFB-6BFD744ACE69}"/>
+          </ac:spMkLst>
+        </pc:spChg>
+        <pc:spChg chg="mod">
+          <ac:chgData name="Chen, David" userId="ca743ca0-a026-471f-bfdf-cc601ae2aa9d" providerId="ADAL" clId="{928448AA-3330-4A68-B58C-1B39F98300F1}" dt="2023-02-28T13:09:32.636" v="1" actId="1076"/>
+          <ac:spMkLst>
+            <pc:docMk/>
+            <pc:sldMk cId="3188284111" sldId="256"/>
+            <ac:spMk id="8" creationId="{5CD33D62-78AA-60FC-8767-F6816D1DB9EA}"/>
+          </ac:spMkLst>
+        </pc:spChg>
+        <pc:spChg chg="mod">
+          <ac:chgData name="Chen, David" userId="ca743ca0-a026-471f-bfdf-cc601ae2aa9d" providerId="ADAL" clId="{928448AA-3330-4A68-B58C-1B39F98300F1}" dt="2023-02-28T13:09:32.636" v="1" actId="1076"/>
+          <ac:spMkLst>
+            <pc:docMk/>
+            <pc:sldMk cId="3188284111" sldId="256"/>
+            <ac:spMk id="10" creationId="{D0B3AD59-8BC6-DBB2-011C-DF8691C6AF29}"/>
+          </ac:spMkLst>
+        </pc:spChg>
+      </pc:sldChg>
+      <pc:sldMasterChg chg="modSp modSldLayout">
+        <pc:chgData name="Chen, David" userId="ca743ca0-a026-471f-bfdf-cc601ae2aa9d" providerId="ADAL" clId="{928448AA-3330-4A68-B58C-1B39F98300F1}" dt="2023-02-28T13:08:23.522" v="0"/>
+        <pc:sldMasterMkLst>
+          <pc:docMk/>
+          <pc:sldMasterMk cId="1084315942" sldId="2147483648"/>
+        </pc:sldMasterMkLst>
+        <pc:spChg chg="mod">
+          <ac:chgData name="Chen, David" userId="ca743ca0-a026-471f-bfdf-cc601ae2aa9d" providerId="ADAL" clId="{928448AA-3330-4A68-B58C-1B39F98300F1}" dt="2023-02-28T13:08:23.522" v="0"/>
+          <ac:spMkLst>
+            <pc:docMk/>
+            <pc:sldMasterMk cId="1084315942" sldId="2147483648"/>
+            <ac:spMk id="2" creationId="{7246146C-2E37-031B-02EA-8CEE89F81F45}"/>
+          </ac:spMkLst>
+        </pc:spChg>
+        <pc:spChg chg="mod">
+          <ac:chgData name="Chen, David" userId="ca743ca0-a026-471f-bfdf-cc601ae2aa9d" providerId="ADAL" clId="{928448AA-3330-4A68-B58C-1B39F98300F1}" dt="2023-02-28T13:08:23.522" v="0"/>
+          <ac:spMkLst>
+            <pc:docMk/>
+            <pc:sldMasterMk cId="1084315942" sldId="2147483648"/>
+            <ac:spMk id="3" creationId="{80DFCD15-36F6-421C-B428-71B79CCBAD70}"/>
+          </ac:spMkLst>
+        </pc:spChg>
+        <pc:spChg chg="mod">
+          <ac:chgData name="Chen, David" userId="ca743ca0-a026-471f-bfdf-cc601ae2aa9d" providerId="ADAL" clId="{928448AA-3330-4A68-B58C-1B39F98300F1}" dt="2023-02-28T13:08:23.522" v="0"/>
+          <ac:spMkLst>
+            <pc:docMk/>
+            <pc:sldMasterMk cId="1084315942" sldId="2147483648"/>
+            <ac:spMk id="4" creationId="{C7EC9470-1086-BEC4-21C1-E67845DD377E}"/>
+          </ac:spMkLst>
+        </pc:spChg>
+        <pc:spChg chg="mod">
+          <ac:chgData name="Chen, David" userId="ca743ca0-a026-471f-bfdf-cc601ae2aa9d" providerId="ADAL" clId="{928448AA-3330-4A68-B58C-1B39F98300F1}" dt="2023-02-28T13:08:23.522" v="0"/>
+          <ac:spMkLst>
+            <pc:docMk/>
+            <pc:sldMasterMk cId="1084315942" sldId="2147483648"/>
+            <ac:spMk id="5" creationId="{0E67618F-E3AE-AC00-0275-67B6F07BC27D}"/>
+          </ac:spMkLst>
+        </pc:spChg>
+        <pc:spChg chg="mod">
+          <ac:chgData name="Chen, David" userId="ca743ca0-a026-471f-bfdf-cc601ae2aa9d" providerId="ADAL" clId="{928448AA-3330-4A68-B58C-1B39F98300F1}" dt="2023-02-28T13:08:23.522" v="0"/>
+          <ac:spMkLst>
+            <pc:docMk/>
+            <pc:sldMasterMk cId="1084315942" sldId="2147483648"/>
+            <ac:spMk id="6" creationId="{29CB3E44-F4E6-8E96-2EDE-1E3DCD75BD49}"/>
+          </ac:spMkLst>
+        </pc:spChg>
+        <pc:sldLayoutChg chg="modSp">
+          <pc:chgData name="Chen, David" userId="ca743ca0-a026-471f-bfdf-cc601ae2aa9d" providerId="ADAL" clId="{928448AA-3330-4A68-B58C-1B39F98300F1}" dt="2023-02-28T13:08:23.522" v="0"/>
+          <pc:sldLayoutMkLst>
+            <pc:docMk/>
+            <pc:sldMasterMk cId="1084315942" sldId="2147483648"/>
+            <pc:sldLayoutMk cId="1017016481" sldId="2147483649"/>
+          </pc:sldLayoutMkLst>
+          <pc:spChg chg="mod">
+            <ac:chgData name="Chen, David" userId="ca743ca0-a026-471f-bfdf-cc601ae2aa9d" providerId="ADAL" clId="{928448AA-3330-4A68-B58C-1B39F98300F1}" dt="2023-02-28T13:08:23.522" v="0"/>
+            <ac:spMkLst>
+              <pc:docMk/>
+              <pc:sldMasterMk cId="1084315942" sldId="2147483648"/>
+              <pc:sldLayoutMk cId="1017016481" sldId="2147483649"/>
+              <ac:spMk id="2" creationId="{44F162B6-D182-D621-E639-BA00E3BFD19C}"/>
+            </ac:spMkLst>
+          </pc:spChg>
+          <pc:spChg chg="mod">
+            <ac:chgData name="Chen, David" userId="ca743ca0-a026-471f-bfdf-cc601ae2aa9d" providerId="ADAL" clId="{928448AA-3330-4A68-B58C-1B39F98300F1}" dt="2023-02-28T13:08:23.522" v="0"/>
+            <ac:spMkLst>
+              <pc:docMk/>
+              <pc:sldMasterMk cId="1084315942" sldId="2147483648"/>
+              <pc:sldLayoutMk cId="1017016481" sldId="2147483649"/>
+              <ac:spMk id="3" creationId="{7B1DFA6F-B0A2-F836-7FED-E68FC8EEB869}"/>
+            </ac:spMkLst>
+          </pc:spChg>
+        </pc:sldLayoutChg>
+        <pc:sldLayoutChg chg="modSp">
+          <pc:chgData name="Chen, David" userId="ca743ca0-a026-471f-bfdf-cc601ae2aa9d" providerId="ADAL" clId="{928448AA-3330-4A68-B58C-1B39F98300F1}" dt="2023-02-28T13:08:23.522" v="0"/>
+          <pc:sldLayoutMkLst>
+            <pc:docMk/>
+            <pc:sldMasterMk cId="1084315942" sldId="2147483648"/>
+            <pc:sldLayoutMk cId="797632875" sldId="2147483651"/>
+          </pc:sldLayoutMkLst>
+          <pc:spChg chg="mod">
+            <ac:chgData name="Chen, David" userId="ca743ca0-a026-471f-bfdf-cc601ae2aa9d" providerId="ADAL" clId="{928448AA-3330-4A68-B58C-1B39F98300F1}" dt="2023-02-28T13:08:23.522" v="0"/>
+            <ac:spMkLst>
+              <pc:docMk/>
+              <pc:sldMasterMk cId="1084315942" sldId="2147483648"/>
+              <pc:sldLayoutMk cId="797632875" sldId="2147483651"/>
+              <ac:spMk id="2" creationId="{F2B806C2-77E2-40B5-881F-84BD18EB3224}"/>
+            </ac:spMkLst>
+          </pc:spChg>
+          <pc:spChg chg="mod">
+            <ac:chgData name="Chen, David" userId="ca743ca0-a026-471f-bfdf-cc601ae2aa9d" providerId="ADAL" clId="{928448AA-3330-4A68-B58C-1B39F98300F1}" dt="2023-02-28T13:08:23.522" v="0"/>
+            <ac:spMkLst>
+              <pc:docMk/>
+              <pc:sldMasterMk cId="1084315942" sldId="2147483648"/>
+              <pc:sldLayoutMk cId="797632875" sldId="2147483651"/>
+              <ac:spMk id="3" creationId="{DBB8239C-2F17-0267-F89B-41CC91577D3B}"/>
+            </ac:spMkLst>
+          </pc:spChg>
+        </pc:sldLayoutChg>
+        <pc:sldLayoutChg chg="modSp">
+          <pc:chgData name="Chen, David" userId="ca743ca0-a026-471f-bfdf-cc601ae2aa9d" providerId="ADAL" clId="{928448AA-3330-4A68-B58C-1B39F98300F1}" dt="2023-02-28T13:08:23.522" v="0"/>
+          <pc:sldLayoutMkLst>
+            <pc:docMk/>
+            <pc:sldMasterMk cId="1084315942" sldId="2147483648"/>
+            <pc:sldLayoutMk cId="2884657002" sldId="2147483652"/>
+          </pc:sldLayoutMkLst>
+          <pc:spChg chg="mod">
+            <ac:chgData name="Chen, David" userId="ca743ca0-a026-471f-bfdf-cc601ae2aa9d" providerId="ADAL" clId="{928448AA-3330-4A68-B58C-1B39F98300F1}" dt="2023-02-28T13:08:23.522" v="0"/>
+            <ac:spMkLst>
+              <pc:docMk/>
+              <pc:sldMasterMk cId="1084315942" sldId="2147483648"/>
+              <pc:sldLayoutMk cId="2884657002" sldId="2147483652"/>
+              <ac:spMk id="3" creationId="{EE95AA75-D470-294B-63FA-CDF31BBFE0E9}"/>
+            </ac:spMkLst>
+          </pc:spChg>
+          <pc:spChg chg="mod">
+            <ac:chgData name="Chen, David" userId="ca743ca0-a026-471f-bfdf-cc601ae2aa9d" providerId="ADAL" clId="{928448AA-3330-4A68-B58C-1B39F98300F1}" dt="2023-02-28T13:08:23.522" v="0"/>
+            <ac:spMkLst>
+              <pc:docMk/>
+              <pc:sldMasterMk cId="1084315942" sldId="2147483648"/>
+              <pc:sldLayoutMk cId="2884657002" sldId="2147483652"/>
+              <ac:spMk id="4" creationId="{11DC7B6D-82D6-CF92-2DA8-AFC9083483E2}"/>
+            </ac:spMkLst>
+          </pc:spChg>
+        </pc:sldLayoutChg>
+        <pc:sldLayoutChg chg="modSp">
+          <pc:chgData name="Chen, David" userId="ca743ca0-a026-471f-bfdf-cc601ae2aa9d" providerId="ADAL" clId="{928448AA-3330-4A68-B58C-1B39F98300F1}" dt="2023-02-28T13:08:23.522" v="0"/>
+          <pc:sldLayoutMkLst>
+            <pc:docMk/>
+            <pc:sldMasterMk cId="1084315942" sldId="2147483648"/>
+            <pc:sldLayoutMk cId="2600747089" sldId="2147483653"/>
+          </pc:sldLayoutMkLst>
+          <pc:spChg chg="mod">
+            <ac:chgData name="Chen, David" userId="ca743ca0-a026-471f-bfdf-cc601ae2aa9d" providerId="ADAL" clId="{928448AA-3330-4A68-B58C-1B39F98300F1}" dt="2023-02-28T13:08:23.522" v="0"/>
+            <ac:spMkLst>
+              <pc:docMk/>
+              <pc:sldMasterMk cId="1084315942" sldId="2147483648"/>
+              <pc:sldLayoutMk cId="2600747089" sldId="2147483653"/>
+              <ac:spMk id="2" creationId="{3E930693-A0F7-EA74-A2D5-44087BCD8F5E}"/>
+            </ac:spMkLst>
+          </pc:spChg>
+          <pc:spChg chg="mod">
+            <ac:chgData name="Chen, David" userId="ca743ca0-a026-471f-bfdf-cc601ae2aa9d" providerId="ADAL" clId="{928448AA-3330-4A68-B58C-1B39F98300F1}" dt="2023-02-28T13:08:23.522" v="0"/>
+            <ac:spMkLst>
+              <pc:docMk/>
+              <pc:sldMasterMk cId="1084315942" sldId="2147483648"/>
+              <pc:sldLayoutMk cId="2600747089" sldId="2147483653"/>
+              <ac:spMk id="3" creationId="{12F05CA7-7F05-2591-3CD7-AE9A95B3613F}"/>
+            </ac:spMkLst>
+          </pc:spChg>
+          <pc:spChg chg="mod">
+            <ac:chgData name="Chen, David" userId="ca743ca0-a026-471f-bfdf-cc601ae2aa9d" providerId="ADAL" clId="{928448AA-3330-4A68-B58C-1B39F98300F1}" dt="2023-02-28T13:08:23.522" v="0"/>
+            <ac:spMkLst>
+              <pc:docMk/>
+              <pc:sldMasterMk cId="1084315942" sldId="2147483648"/>
+              <pc:sldLayoutMk cId="2600747089" sldId="2147483653"/>
+              <ac:spMk id="4" creationId="{F0B469F6-1A8C-70F4-EF36-BBD4FE50327E}"/>
+            </ac:spMkLst>
+          </pc:spChg>
+          <pc:spChg chg="mod">
+            <ac:chgData name="Chen, David" userId="ca743ca0-a026-471f-bfdf-cc601ae2aa9d" providerId="ADAL" clId="{928448AA-3330-4A68-B58C-1B39F98300F1}" dt="2023-02-28T13:08:23.522" v="0"/>
+            <ac:spMkLst>
+              <pc:docMk/>
+              <pc:sldMasterMk cId="1084315942" sldId="2147483648"/>
+              <pc:sldLayoutMk cId="2600747089" sldId="2147483653"/>
+              <ac:spMk id="5" creationId="{B6E85624-5D09-FCD7-7F24-ABF66DAEEB2D}"/>
+            </ac:spMkLst>
+          </pc:spChg>
+          <pc:spChg chg="mod">
+            <ac:chgData name="Chen, David" userId="ca743ca0-a026-471f-bfdf-cc601ae2aa9d" providerId="ADAL" clId="{928448AA-3330-4A68-B58C-1B39F98300F1}" dt="2023-02-28T13:08:23.522" v="0"/>
+            <ac:spMkLst>
+              <pc:docMk/>
+              <pc:sldMasterMk cId="1084315942" sldId="2147483648"/>
+              <pc:sldLayoutMk cId="2600747089" sldId="2147483653"/>
+              <ac:spMk id="6" creationId="{673F4F26-0F0F-96CF-99BA-68772F38B728}"/>
+            </ac:spMkLst>
+          </pc:spChg>
+        </pc:sldLayoutChg>
+        <pc:sldLayoutChg chg="modSp">
+          <pc:chgData name="Chen, David" userId="ca743ca0-a026-471f-bfdf-cc601ae2aa9d" providerId="ADAL" clId="{928448AA-3330-4A68-B58C-1B39F98300F1}" dt="2023-02-28T13:08:23.522" v="0"/>
+          <pc:sldLayoutMkLst>
+            <pc:docMk/>
+            <pc:sldMasterMk cId="1084315942" sldId="2147483648"/>
+            <pc:sldLayoutMk cId="687012723" sldId="2147483656"/>
+          </pc:sldLayoutMkLst>
+          <pc:spChg chg="mod">
+            <ac:chgData name="Chen, David" userId="ca743ca0-a026-471f-bfdf-cc601ae2aa9d" providerId="ADAL" clId="{928448AA-3330-4A68-B58C-1B39F98300F1}" dt="2023-02-28T13:08:23.522" v="0"/>
+            <ac:spMkLst>
+              <pc:docMk/>
+              <pc:sldMasterMk cId="1084315942" sldId="2147483648"/>
+              <pc:sldLayoutMk cId="687012723" sldId="2147483656"/>
+              <ac:spMk id="2" creationId="{E3C0CFE5-53E3-3AED-D0F7-880242578F5F}"/>
+            </ac:spMkLst>
+          </pc:spChg>
+          <pc:spChg chg="mod">
+            <ac:chgData name="Chen, David" userId="ca743ca0-a026-471f-bfdf-cc601ae2aa9d" providerId="ADAL" clId="{928448AA-3330-4A68-B58C-1B39F98300F1}" dt="2023-02-28T13:08:23.522" v="0"/>
+            <ac:spMkLst>
+              <pc:docMk/>
+              <pc:sldMasterMk cId="1084315942" sldId="2147483648"/>
+              <pc:sldLayoutMk cId="687012723" sldId="2147483656"/>
+              <ac:spMk id="3" creationId="{75FDE97F-DEA7-810A-93F7-21B8FA7E9ABB}"/>
+            </ac:spMkLst>
+          </pc:spChg>
+          <pc:spChg chg="mod">
+            <ac:chgData name="Chen, David" userId="ca743ca0-a026-471f-bfdf-cc601ae2aa9d" providerId="ADAL" clId="{928448AA-3330-4A68-B58C-1B39F98300F1}" dt="2023-02-28T13:08:23.522" v="0"/>
+            <ac:spMkLst>
+              <pc:docMk/>
+              <pc:sldMasterMk cId="1084315942" sldId="2147483648"/>
+              <pc:sldLayoutMk cId="687012723" sldId="2147483656"/>
+              <ac:spMk id="4" creationId="{A94255D5-62B5-178F-FD00-652216F7B803}"/>
+            </ac:spMkLst>
+          </pc:spChg>
+        </pc:sldLayoutChg>
+        <pc:sldLayoutChg chg="modSp">
+          <pc:chgData name="Chen, David" userId="ca743ca0-a026-471f-bfdf-cc601ae2aa9d" providerId="ADAL" clId="{928448AA-3330-4A68-B58C-1B39F98300F1}" dt="2023-02-28T13:08:23.522" v="0"/>
+          <pc:sldLayoutMkLst>
+            <pc:docMk/>
+            <pc:sldMasterMk cId="1084315942" sldId="2147483648"/>
+            <pc:sldLayoutMk cId="1039521961" sldId="2147483657"/>
+          </pc:sldLayoutMkLst>
+          <pc:spChg chg="mod">
+            <ac:chgData name="Chen, David" userId="ca743ca0-a026-471f-bfdf-cc601ae2aa9d" providerId="ADAL" clId="{928448AA-3330-4A68-B58C-1B39F98300F1}" dt="2023-02-28T13:08:23.522" v="0"/>
+            <ac:spMkLst>
+              <pc:docMk/>
+              <pc:sldMasterMk cId="1084315942" sldId="2147483648"/>
+              <pc:sldLayoutMk cId="1039521961" sldId="2147483657"/>
+              <ac:spMk id="2" creationId="{4869E7A3-45B3-0D6B-F95C-DABA64B618C6}"/>
+            </ac:spMkLst>
+          </pc:spChg>
+          <pc:spChg chg="mod">
+            <ac:chgData name="Chen, David" userId="ca743ca0-a026-471f-bfdf-cc601ae2aa9d" providerId="ADAL" clId="{928448AA-3330-4A68-B58C-1B39F98300F1}" dt="2023-02-28T13:08:23.522" v="0"/>
+            <ac:spMkLst>
+              <pc:docMk/>
+              <pc:sldMasterMk cId="1084315942" sldId="2147483648"/>
+              <pc:sldLayoutMk cId="1039521961" sldId="2147483657"/>
+              <ac:spMk id="3" creationId="{8AD4A502-085B-3BB9-8377-6D7CA22790CE}"/>
+            </ac:spMkLst>
+          </pc:spChg>
+          <pc:spChg chg="mod">
+            <ac:chgData name="Chen, David" userId="ca743ca0-a026-471f-bfdf-cc601ae2aa9d" providerId="ADAL" clId="{928448AA-3330-4A68-B58C-1B39F98300F1}" dt="2023-02-28T13:08:23.522" v="0"/>
+            <ac:spMkLst>
+              <pc:docMk/>
+              <pc:sldMasterMk cId="1084315942" sldId="2147483648"/>
+              <pc:sldLayoutMk cId="1039521961" sldId="2147483657"/>
+              <ac:spMk id="4" creationId="{35372F4A-CEB4-1DC4-EBEA-EF37A07ECDEC}"/>
+            </ac:spMkLst>
+          </pc:spChg>
+        </pc:sldLayoutChg>
+        <pc:sldLayoutChg chg="modSp">
+          <pc:chgData name="Chen, David" userId="ca743ca0-a026-471f-bfdf-cc601ae2aa9d" providerId="ADAL" clId="{928448AA-3330-4A68-B58C-1B39F98300F1}" dt="2023-02-28T13:08:23.522" v="0"/>
+          <pc:sldLayoutMkLst>
+            <pc:docMk/>
+            <pc:sldMasterMk cId="1084315942" sldId="2147483648"/>
+            <pc:sldLayoutMk cId="3335838355" sldId="2147483659"/>
+          </pc:sldLayoutMkLst>
+          <pc:spChg chg="mod">
+            <ac:chgData name="Chen, David" userId="ca743ca0-a026-471f-bfdf-cc601ae2aa9d" providerId="ADAL" clId="{928448AA-3330-4A68-B58C-1B39F98300F1}" dt="2023-02-28T13:08:23.522" v="0"/>
+            <ac:spMkLst>
+              <pc:docMk/>
+              <pc:sldMasterMk cId="1084315942" sldId="2147483648"/>
+              <pc:sldLayoutMk cId="3335838355" sldId="2147483659"/>
+              <ac:spMk id="2" creationId="{2A723938-FD12-7FB4-0B85-234C986F4476}"/>
+            </ac:spMkLst>
+          </pc:spChg>
+          <pc:spChg chg="mod">
+            <ac:chgData name="Chen, David" userId="ca743ca0-a026-471f-bfdf-cc601ae2aa9d" providerId="ADAL" clId="{928448AA-3330-4A68-B58C-1B39F98300F1}" dt="2023-02-28T13:08:23.522" v="0"/>
+            <ac:spMkLst>
+              <pc:docMk/>
+              <pc:sldMasterMk cId="1084315942" sldId="2147483648"/>
+              <pc:sldLayoutMk cId="3335838355" sldId="2147483659"/>
+              <ac:spMk id="3" creationId="{C20B6FBD-3C39-80EC-4C81-A704573548F9}"/>
+            </ac:spMkLst>
+          </pc:spChg>
+        </pc:sldLayoutChg>
+      </pc:sldMasterChg>
+    </pc:docChg>
+  </pc:docChgLst>
+</pc:chgInfo>
 </file>
 
 <file path=ppt/slideLayouts/slideLayout1.xml><?xml version="1.0" encoding="utf-8"?>
@@ -126,13 +466,7 @@
       </p:grpSpPr>
       <p:sp>
         <p:nvSpPr>
-          <p:cNvPr id="2" name="Title 1">
-            <a:extLst>
-              <a:ext uri="{FF2B5EF4-FFF2-40B4-BE49-F238E27FC236}">
-                <a16:creationId xmlns:a16="http://schemas.microsoft.com/office/drawing/2014/main" id="{44F162B6-D182-D621-E639-BA00E3BFD19C}"/>
-              </a:ext>
-            </a:extLst>
-          </p:cNvPr>
+          <p:cNvPr id="2" name="Title 1"/>
           <p:cNvSpPr>
             <a:spLocks noGrp="1"/>
           </p:cNvSpPr>
@@ -142,15 +476,15 @@
         </p:nvSpPr>
         <p:spPr>
           <a:xfrm>
-            <a:off x="1524000" y="1122363"/>
-            <a:ext cx="9144000" cy="2387600"/>
+            <a:off x="1124942" y="353596"/>
+            <a:ext cx="6749654" cy="752205"/>
           </a:xfrm>
         </p:spPr>
         <p:txBody>
           <a:bodyPr anchor="b"/>
           <a:lstStyle>
             <a:lvl1pPr algn="ctr">
-              <a:defRPr sz="6000"/>
+              <a:defRPr sz="1890"/>
             </a:lvl1pPr>
           </a:lstStyle>
           <a:p>
@@ -158,19 +492,13 @@
               <a:rPr lang="en-US"/>
               <a:t>Click to edit Master title style</a:t>
             </a:r>
-            <a:endParaRPr lang="nl-NL"/>
-          </a:p>
-        </p:txBody>
-      </p:sp>
-      <p:sp>
-        <p:nvSpPr>
-          <p:cNvPr id="3" name="Subtitle 2">
-            <a:extLst>
-              <a:ext uri="{FF2B5EF4-FFF2-40B4-BE49-F238E27FC236}">
-                <a16:creationId xmlns:a16="http://schemas.microsoft.com/office/drawing/2014/main" id="{7B1DFA6F-B0A2-F836-7FED-E68FC8EEB869}"/>
-              </a:ext>
-            </a:extLst>
-          </p:cNvPr>
+            <a:endParaRPr lang="en-US" dirty="0"/>
+          </a:p>
+        </p:txBody>
+      </p:sp>
+      <p:sp>
+        <p:nvSpPr>
+          <p:cNvPr id="3" name="Subtitle 2"/>
           <p:cNvSpPr>
             <a:spLocks noGrp="1"/>
           </p:cNvSpPr>
@@ -180,8 +508,8 @@
         </p:nvSpPr>
         <p:spPr>
           <a:xfrm>
-            <a:off x="1524000" y="3602038"/>
-            <a:ext cx="9144000" cy="1655762"/>
+            <a:off x="1124942" y="1134809"/>
+            <a:ext cx="6749654" cy="521642"/>
           </a:xfrm>
         </p:spPr>
         <p:txBody>
@@ -189,39 +517,39 @@
           <a:lstStyle>
             <a:lvl1pPr marL="0" indent="0" algn="ctr">
               <a:buNone/>
-              <a:defRPr sz="2400"/>
+              <a:defRPr sz="756"/>
             </a:lvl1pPr>
-            <a:lvl2pPr marL="457200" indent="0" algn="ctr">
-              <a:buNone/>
-              <a:defRPr sz="2000"/>
+            <a:lvl2pPr marL="144018" indent="0" algn="ctr">
+              <a:buNone/>
+              <a:defRPr sz="630"/>
             </a:lvl2pPr>
-            <a:lvl3pPr marL="914400" indent="0" algn="ctr">
-              <a:buNone/>
-              <a:defRPr sz="1800"/>
+            <a:lvl3pPr marL="288036" indent="0" algn="ctr">
+              <a:buNone/>
+              <a:defRPr sz="567"/>
             </a:lvl3pPr>
-            <a:lvl4pPr marL="1371600" indent="0" algn="ctr">
-              <a:buNone/>
-              <a:defRPr sz="1600"/>
+            <a:lvl4pPr marL="432054" indent="0" algn="ctr">
+              <a:buNone/>
+              <a:defRPr sz="504"/>
             </a:lvl4pPr>
-            <a:lvl5pPr marL="1828800" indent="0" algn="ctr">
-              <a:buNone/>
-              <a:defRPr sz="1600"/>
+            <a:lvl5pPr marL="576072" indent="0" algn="ctr">
+              <a:buNone/>
+              <a:defRPr sz="504"/>
             </a:lvl5pPr>
-            <a:lvl6pPr marL="2286000" indent="0" algn="ctr">
-              <a:buNone/>
-              <a:defRPr sz="1600"/>
+            <a:lvl6pPr marL="720090" indent="0" algn="ctr">
+              <a:buNone/>
+              <a:defRPr sz="504"/>
             </a:lvl6pPr>
-            <a:lvl7pPr marL="2743200" indent="0" algn="ctr">
-              <a:buNone/>
-              <a:defRPr sz="1600"/>
+            <a:lvl7pPr marL="864108" indent="0" algn="ctr">
+              <a:buNone/>
+              <a:defRPr sz="504"/>
             </a:lvl7pPr>
-            <a:lvl8pPr marL="3200400" indent="0" algn="ctr">
-              <a:buNone/>
-              <a:defRPr sz="1600"/>
+            <a:lvl8pPr marL="1008126" indent="0" algn="ctr">
+              <a:buNone/>
+              <a:defRPr sz="504"/>
             </a:lvl8pPr>
-            <a:lvl9pPr marL="3657600" indent="0" algn="ctr">
-              <a:buNone/>
-              <a:defRPr sz="1600"/>
+            <a:lvl9pPr marL="1152144" indent="0" algn="ctr">
+              <a:buNone/>
+              <a:defRPr sz="504"/>
             </a:lvl9pPr>
           </a:lstStyle>
           <a:p>
@@ -229,19 +557,13 @@
               <a:rPr lang="en-US"/>
               <a:t>Click to edit Master subtitle style</a:t>
             </a:r>
-            <a:endParaRPr lang="nl-NL"/>
-          </a:p>
-        </p:txBody>
-      </p:sp>
-      <p:sp>
-        <p:nvSpPr>
-          <p:cNvPr id="4" name="Date Placeholder 3">
-            <a:extLst>
-              <a:ext uri="{FF2B5EF4-FFF2-40B4-BE49-F238E27FC236}">
-                <a16:creationId xmlns:a16="http://schemas.microsoft.com/office/drawing/2014/main" id="{28BE793D-6168-F011-7610-EFD8659BC9F0}"/>
-              </a:ext>
-            </a:extLst>
-          </p:cNvPr>
+            <a:endParaRPr lang="en-US" dirty="0"/>
+          </a:p>
+        </p:txBody>
+      </p:sp>
+      <p:sp>
+        <p:nvSpPr>
+          <p:cNvPr id="4" name="Date Placeholder 3"/>
           <p:cNvSpPr>
             <a:spLocks noGrp="1"/>
           </p:cNvSpPr>
@@ -264,13 +586,7 @@
       </p:sp>
       <p:sp>
         <p:nvSpPr>
-          <p:cNvPr id="5" name="Footer Placeholder 4">
-            <a:extLst>
-              <a:ext uri="{FF2B5EF4-FFF2-40B4-BE49-F238E27FC236}">
-                <a16:creationId xmlns:a16="http://schemas.microsoft.com/office/drawing/2014/main" id="{CA13A9E7-AD28-FA23-F065-573A651F71AC}"/>
-              </a:ext>
-            </a:extLst>
-          </p:cNvPr>
+          <p:cNvPr id="5" name="Footer Placeholder 4"/>
           <p:cNvSpPr>
             <a:spLocks noGrp="1"/>
           </p:cNvSpPr>
@@ -289,13 +605,7 @@
       </p:sp>
       <p:sp>
         <p:nvSpPr>
-          <p:cNvPr id="6" name="Slide Number Placeholder 5">
-            <a:extLst>
-              <a:ext uri="{FF2B5EF4-FFF2-40B4-BE49-F238E27FC236}">
-                <a16:creationId xmlns:a16="http://schemas.microsoft.com/office/drawing/2014/main" id="{BB7FF363-7942-604F-68B0-802C886AA9B3}"/>
-              </a:ext>
-            </a:extLst>
-          </p:cNvPr>
+          <p:cNvPr id="6" name="Slide Number Placeholder 5"/>
           <p:cNvSpPr>
             <a:spLocks noGrp="1"/>
           </p:cNvSpPr>
@@ -319,7 +629,7 @@
     </p:spTree>
     <p:extLst>
       <p:ext uri="{BB962C8B-B14F-4D97-AF65-F5344CB8AC3E}">
-        <p14:creationId xmlns:p14="http://schemas.microsoft.com/office/powerpoint/2010/main" val="1017016481"/>
+        <p14:creationId xmlns:p14="http://schemas.microsoft.com/office/powerpoint/2010/main" val="2409779549"/>
       </p:ext>
     </p:extLst>
   </p:cSld>
@@ -348,13 +658,7 @@
       </p:grpSpPr>
       <p:sp>
         <p:nvSpPr>
-          <p:cNvPr id="2" name="Title 1">
-            <a:extLst>
-              <a:ext uri="{FF2B5EF4-FFF2-40B4-BE49-F238E27FC236}">
-                <a16:creationId xmlns:a16="http://schemas.microsoft.com/office/drawing/2014/main" id="{BDD36562-4EC8-C585-3237-7698A7A46899}"/>
-              </a:ext>
-            </a:extLst>
-          </p:cNvPr>
+          <p:cNvPr id="2" name="Title 1"/>
           <p:cNvSpPr>
             <a:spLocks noGrp="1"/>
           </p:cNvSpPr>
@@ -371,19 +675,13 @@
               <a:rPr lang="en-US"/>
               <a:t>Click to edit Master title style</a:t>
             </a:r>
-            <a:endParaRPr lang="nl-NL"/>
-          </a:p>
-        </p:txBody>
-      </p:sp>
-      <p:sp>
-        <p:nvSpPr>
-          <p:cNvPr id="3" name="Vertical Text Placeholder 2">
-            <a:extLst>
-              <a:ext uri="{FF2B5EF4-FFF2-40B4-BE49-F238E27FC236}">
-                <a16:creationId xmlns:a16="http://schemas.microsoft.com/office/drawing/2014/main" id="{8BC5B822-2302-FC32-4E07-2366BC9244B6}"/>
-              </a:ext>
-            </a:extLst>
-          </p:cNvPr>
+            <a:endParaRPr lang="en-US" dirty="0"/>
+          </a:p>
+        </p:txBody>
+      </p:sp>
+      <p:sp>
+        <p:nvSpPr>
+          <p:cNvPr id="3" name="Vertical Text Placeholder 2"/>
           <p:cNvSpPr>
             <a:spLocks noGrp="1"/>
           </p:cNvSpPr>
@@ -429,19 +727,13 @@
               <a:rPr lang="en-US"/>
               <a:t>Fifth level</a:t>
             </a:r>
-            <a:endParaRPr lang="nl-NL"/>
-          </a:p>
-        </p:txBody>
-      </p:sp>
-      <p:sp>
-        <p:nvSpPr>
-          <p:cNvPr id="4" name="Date Placeholder 3">
-            <a:extLst>
-              <a:ext uri="{FF2B5EF4-FFF2-40B4-BE49-F238E27FC236}">
-                <a16:creationId xmlns:a16="http://schemas.microsoft.com/office/drawing/2014/main" id="{B3186CD7-3EBD-0824-3BA5-00921DBFE4B5}"/>
-              </a:ext>
-            </a:extLst>
-          </p:cNvPr>
+            <a:endParaRPr lang="en-US" dirty="0"/>
+          </a:p>
+        </p:txBody>
+      </p:sp>
+      <p:sp>
+        <p:nvSpPr>
+          <p:cNvPr id="4" name="Date Placeholder 3"/>
           <p:cNvSpPr>
             <a:spLocks noGrp="1"/>
           </p:cNvSpPr>
@@ -464,13 +756,7 @@
       </p:sp>
       <p:sp>
         <p:nvSpPr>
-          <p:cNvPr id="5" name="Footer Placeholder 4">
-            <a:extLst>
-              <a:ext uri="{FF2B5EF4-FFF2-40B4-BE49-F238E27FC236}">
-                <a16:creationId xmlns:a16="http://schemas.microsoft.com/office/drawing/2014/main" id="{6AD68010-668E-290A-4E41-33A4A8B8E08A}"/>
-              </a:ext>
-            </a:extLst>
-          </p:cNvPr>
+          <p:cNvPr id="5" name="Footer Placeholder 4"/>
           <p:cNvSpPr>
             <a:spLocks noGrp="1"/>
           </p:cNvSpPr>
@@ -489,13 +775,7 @@
       </p:sp>
       <p:sp>
         <p:nvSpPr>
-          <p:cNvPr id="6" name="Slide Number Placeholder 5">
-            <a:extLst>
-              <a:ext uri="{FF2B5EF4-FFF2-40B4-BE49-F238E27FC236}">
-                <a16:creationId xmlns:a16="http://schemas.microsoft.com/office/drawing/2014/main" id="{9B38AAEC-8879-1437-3F83-C4A0517CEE1A}"/>
-              </a:ext>
-            </a:extLst>
-          </p:cNvPr>
+          <p:cNvPr id="6" name="Slide Number Placeholder 5"/>
           <p:cNvSpPr>
             <a:spLocks noGrp="1"/>
           </p:cNvSpPr>
@@ -519,7 +799,7 @@
     </p:spTree>
     <p:extLst>
       <p:ext uri="{BB962C8B-B14F-4D97-AF65-F5344CB8AC3E}">
-        <p14:creationId xmlns:p14="http://schemas.microsoft.com/office/powerpoint/2010/main" val="1915721993"/>
+        <p14:creationId xmlns:p14="http://schemas.microsoft.com/office/powerpoint/2010/main" val="933862009"/>
       </p:ext>
     </p:extLst>
   </p:cSld>
@@ -548,13 +828,7 @@
       </p:grpSpPr>
       <p:sp>
         <p:nvSpPr>
-          <p:cNvPr id="2" name="Vertical Title 1">
-            <a:extLst>
-              <a:ext uri="{FF2B5EF4-FFF2-40B4-BE49-F238E27FC236}">
-                <a16:creationId xmlns:a16="http://schemas.microsoft.com/office/drawing/2014/main" id="{2A723938-FD12-7FB4-0B85-234C986F4476}"/>
-              </a:ext>
-            </a:extLst>
-          </p:cNvPr>
+          <p:cNvPr id="2" name="Vertical Title 1"/>
           <p:cNvSpPr>
             <a:spLocks noGrp="1"/>
           </p:cNvSpPr>
@@ -564,8 +838,8 @@
         </p:nvSpPr>
         <p:spPr>
           <a:xfrm>
-            <a:off x="8724900" y="365125"/>
-            <a:ext cx="2628900" cy="5811838"/>
+            <a:off x="6440295" y="115032"/>
+            <a:ext cx="1940525" cy="1830998"/>
           </a:xfrm>
         </p:spPr>
         <p:txBody>
@@ -576,19 +850,13 @@
               <a:rPr lang="en-US"/>
               <a:t>Click to edit Master title style</a:t>
             </a:r>
-            <a:endParaRPr lang="nl-NL"/>
-          </a:p>
-        </p:txBody>
-      </p:sp>
-      <p:sp>
-        <p:nvSpPr>
-          <p:cNvPr id="3" name="Vertical Text Placeholder 2">
-            <a:extLst>
-              <a:ext uri="{FF2B5EF4-FFF2-40B4-BE49-F238E27FC236}">
-                <a16:creationId xmlns:a16="http://schemas.microsoft.com/office/drawing/2014/main" id="{C20B6FBD-3C39-80EC-4C81-A704573548F9}"/>
-              </a:ext>
-            </a:extLst>
-          </p:cNvPr>
+            <a:endParaRPr lang="en-US" dirty="0"/>
+          </a:p>
+        </p:txBody>
+      </p:sp>
+      <p:sp>
+        <p:nvSpPr>
+          <p:cNvPr id="3" name="Vertical Text Placeholder 2"/>
           <p:cNvSpPr>
             <a:spLocks noGrp="1"/>
           </p:cNvSpPr>
@@ -598,8 +866,8 @@
         </p:nvSpPr>
         <p:spPr>
           <a:xfrm>
-            <a:off x="838200" y="365125"/>
-            <a:ext cx="7734300" cy="5811838"/>
+            <a:off x="618718" y="115032"/>
+            <a:ext cx="5709082" cy="1830998"/>
           </a:xfrm>
         </p:spPr>
         <p:txBody>
@@ -639,19 +907,13 @@
               <a:rPr lang="en-US"/>
               <a:t>Fifth level</a:t>
             </a:r>
-            <a:endParaRPr lang="nl-NL"/>
-          </a:p>
-        </p:txBody>
-      </p:sp>
-      <p:sp>
-        <p:nvSpPr>
-          <p:cNvPr id="4" name="Date Placeholder 3">
-            <a:extLst>
-              <a:ext uri="{FF2B5EF4-FFF2-40B4-BE49-F238E27FC236}">
-                <a16:creationId xmlns:a16="http://schemas.microsoft.com/office/drawing/2014/main" id="{0CBF6C35-9C6F-6262-AEEB-46818F0AEF03}"/>
-              </a:ext>
-            </a:extLst>
-          </p:cNvPr>
+            <a:endParaRPr lang="en-US" dirty="0"/>
+          </a:p>
+        </p:txBody>
+      </p:sp>
+      <p:sp>
+        <p:nvSpPr>
+          <p:cNvPr id="4" name="Date Placeholder 3"/>
           <p:cNvSpPr>
             <a:spLocks noGrp="1"/>
           </p:cNvSpPr>
@@ -674,13 +936,7 @@
       </p:sp>
       <p:sp>
         <p:nvSpPr>
-          <p:cNvPr id="5" name="Footer Placeholder 4">
-            <a:extLst>
-              <a:ext uri="{FF2B5EF4-FFF2-40B4-BE49-F238E27FC236}">
-                <a16:creationId xmlns:a16="http://schemas.microsoft.com/office/drawing/2014/main" id="{BD4D8DC1-0E1D-2B8F-275B-16988D0340B5}"/>
-              </a:ext>
-            </a:extLst>
-          </p:cNvPr>
+          <p:cNvPr id="5" name="Footer Placeholder 4"/>
           <p:cNvSpPr>
             <a:spLocks noGrp="1"/>
           </p:cNvSpPr>
@@ -699,13 +955,7 @@
       </p:sp>
       <p:sp>
         <p:nvSpPr>
-          <p:cNvPr id="6" name="Slide Number Placeholder 5">
-            <a:extLst>
-              <a:ext uri="{FF2B5EF4-FFF2-40B4-BE49-F238E27FC236}">
-                <a16:creationId xmlns:a16="http://schemas.microsoft.com/office/drawing/2014/main" id="{D609A667-D127-4FB5-7655-6BC644D392EA}"/>
-              </a:ext>
-            </a:extLst>
-          </p:cNvPr>
+          <p:cNvPr id="6" name="Slide Number Placeholder 5"/>
           <p:cNvSpPr>
             <a:spLocks noGrp="1"/>
           </p:cNvSpPr>
@@ -729,7 +979,7 @@
     </p:spTree>
     <p:extLst>
       <p:ext uri="{BB962C8B-B14F-4D97-AF65-F5344CB8AC3E}">
-        <p14:creationId xmlns:p14="http://schemas.microsoft.com/office/powerpoint/2010/main" val="3335838355"/>
+        <p14:creationId xmlns:p14="http://schemas.microsoft.com/office/powerpoint/2010/main" val="3954148757"/>
       </p:ext>
     </p:extLst>
   </p:cSld>
@@ -758,13 +1008,7 @@
       </p:grpSpPr>
       <p:sp>
         <p:nvSpPr>
-          <p:cNvPr id="2" name="Title 1">
-            <a:extLst>
-              <a:ext uri="{FF2B5EF4-FFF2-40B4-BE49-F238E27FC236}">
-                <a16:creationId xmlns:a16="http://schemas.microsoft.com/office/drawing/2014/main" id="{C7E68069-E059-3C67-C186-AB8AE81C916C}"/>
-              </a:ext>
-            </a:extLst>
-          </p:cNvPr>
+          <p:cNvPr id="2" name="Title 1"/>
           <p:cNvSpPr>
             <a:spLocks noGrp="1"/>
           </p:cNvSpPr>
@@ -781,19 +1025,13 @@
               <a:rPr lang="en-US"/>
               <a:t>Click to edit Master title style</a:t>
             </a:r>
-            <a:endParaRPr lang="nl-NL"/>
-          </a:p>
-        </p:txBody>
-      </p:sp>
-      <p:sp>
-        <p:nvSpPr>
-          <p:cNvPr id="3" name="Content Placeholder 2">
-            <a:extLst>
-              <a:ext uri="{FF2B5EF4-FFF2-40B4-BE49-F238E27FC236}">
-                <a16:creationId xmlns:a16="http://schemas.microsoft.com/office/drawing/2014/main" id="{62853F93-17CE-C11D-8635-4BE345A75B81}"/>
-              </a:ext>
-            </a:extLst>
-          </p:cNvPr>
+            <a:endParaRPr lang="en-US" dirty="0"/>
+          </a:p>
+        </p:txBody>
+      </p:sp>
+      <p:sp>
+        <p:nvSpPr>
+          <p:cNvPr id="3" name="Content Placeholder 2"/>
           <p:cNvSpPr>
             <a:spLocks noGrp="1"/>
           </p:cNvSpPr>
@@ -839,19 +1077,13 @@
               <a:rPr lang="en-US"/>
               <a:t>Fifth level</a:t>
             </a:r>
-            <a:endParaRPr lang="nl-NL"/>
-          </a:p>
-        </p:txBody>
-      </p:sp>
-      <p:sp>
-        <p:nvSpPr>
-          <p:cNvPr id="4" name="Date Placeholder 3">
-            <a:extLst>
-              <a:ext uri="{FF2B5EF4-FFF2-40B4-BE49-F238E27FC236}">
-                <a16:creationId xmlns:a16="http://schemas.microsoft.com/office/drawing/2014/main" id="{7A5B3310-C3A9-04D9-2E90-92EF1A813CB6}"/>
-              </a:ext>
-            </a:extLst>
-          </p:cNvPr>
+            <a:endParaRPr lang="en-US" dirty="0"/>
+          </a:p>
+        </p:txBody>
+      </p:sp>
+      <p:sp>
+        <p:nvSpPr>
+          <p:cNvPr id="4" name="Date Placeholder 3"/>
           <p:cNvSpPr>
             <a:spLocks noGrp="1"/>
           </p:cNvSpPr>
@@ -874,13 +1106,7 @@
       </p:sp>
       <p:sp>
         <p:nvSpPr>
-          <p:cNvPr id="5" name="Footer Placeholder 4">
-            <a:extLst>
-              <a:ext uri="{FF2B5EF4-FFF2-40B4-BE49-F238E27FC236}">
-                <a16:creationId xmlns:a16="http://schemas.microsoft.com/office/drawing/2014/main" id="{B2B1A553-1557-2814-292C-8AC0DF3AC354}"/>
-              </a:ext>
-            </a:extLst>
-          </p:cNvPr>
+          <p:cNvPr id="5" name="Footer Placeholder 4"/>
           <p:cNvSpPr>
             <a:spLocks noGrp="1"/>
           </p:cNvSpPr>
@@ -899,13 +1125,7 @@
       </p:sp>
       <p:sp>
         <p:nvSpPr>
-          <p:cNvPr id="6" name="Slide Number Placeholder 5">
-            <a:extLst>
-              <a:ext uri="{FF2B5EF4-FFF2-40B4-BE49-F238E27FC236}">
-                <a16:creationId xmlns:a16="http://schemas.microsoft.com/office/drawing/2014/main" id="{7ABACCB7-6455-F8A9-D1AE-7FC8D02F941F}"/>
-              </a:ext>
-            </a:extLst>
-          </p:cNvPr>
+          <p:cNvPr id="6" name="Slide Number Placeholder 5"/>
           <p:cNvSpPr>
             <a:spLocks noGrp="1"/>
           </p:cNvSpPr>
@@ -929,7 +1149,7 @@
     </p:spTree>
     <p:extLst>
       <p:ext uri="{BB962C8B-B14F-4D97-AF65-F5344CB8AC3E}">
-        <p14:creationId xmlns:p14="http://schemas.microsoft.com/office/powerpoint/2010/main" val="847353553"/>
+        <p14:creationId xmlns:p14="http://schemas.microsoft.com/office/powerpoint/2010/main" val="107234195"/>
       </p:ext>
     </p:extLst>
   </p:cSld>
@@ -958,13 +1178,7 @@
       </p:grpSpPr>
       <p:sp>
         <p:nvSpPr>
-          <p:cNvPr id="2" name="Title 1">
-            <a:extLst>
-              <a:ext uri="{FF2B5EF4-FFF2-40B4-BE49-F238E27FC236}">
-                <a16:creationId xmlns:a16="http://schemas.microsoft.com/office/drawing/2014/main" id="{F2B806C2-77E2-40B5-881F-84BD18EB3224}"/>
-              </a:ext>
-            </a:extLst>
-          </p:cNvPr>
+          <p:cNvPr id="2" name="Title 1"/>
           <p:cNvSpPr>
             <a:spLocks noGrp="1"/>
           </p:cNvSpPr>
@@ -974,15 +1188,15 @@
         </p:nvSpPr>
         <p:spPr>
           <a:xfrm>
-            <a:off x="831850" y="1709738"/>
-            <a:ext cx="10515600" cy="2852737"/>
+            <a:off x="614031" y="538647"/>
+            <a:ext cx="7762102" cy="898744"/>
           </a:xfrm>
         </p:spPr>
         <p:txBody>
           <a:bodyPr anchor="b"/>
           <a:lstStyle>
             <a:lvl1pPr>
-              <a:defRPr sz="6000"/>
+              <a:defRPr sz="1890"/>
             </a:lvl1pPr>
           </a:lstStyle>
           <a:p>
@@ -990,19 +1204,13 @@
               <a:rPr lang="en-US"/>
               <a:t>Click to edit Master title style</a:t>
             </a:r>
-            <a:endParaRPr lang="nl-NL"/>
-          </a:p>
-        </p:txBody>
-      </p:sp>
-      <p:sp>
-        <p:nvSpPr>
-          <p:cNvPr id="3" name="Text Placeholder 2">
-            <a:extLst>
-              <a:ext uri="{FF2B5EF4-FFF2-40B4-BE49-F238E27FC236}">
-                <a16:creationId xmlns:a16="http://schemas.microsoft.com/office/drawing/2014/main" id="{DBB8239C-2F17-0267-F89B-41CC91577D3B}"/>
-              </a:ext>
-            </a:extLst>
-          </p:cNvPr>
+            <a:endParaRPr lang="en-US" dirty="0"/>
+          </a:p>
+        </p:txBody>
+      </p:sp>
+      <p:sp>
+        <p:nvSpPr>
+          <p:cNvPr id="3" name="Text Placeholder 2"/>
           <p:cNvSpPr>
             <a:spLocks noGrp="1"/>
           </p:cNvSpPr>
@@ -1012,8 +1220,8 @@
         </p:nvSpPr>
         <p:spPr>
           <a:xfrm>
-            <a:off x="831850" y="4589463"/>
-            <a:ext cx="10515600" cy="1500187"/>
+            <a:off x="614031" y="1445894"/>
+            <a:ext cx="7762102" cy="472628"/>
           </a:xfrm>
         </p:spPr>
         <p:txBody>
@@ -1021,7 +1229,7 @@
           <a:lstStyle>
             <a:lvl1pPr marL="0" indent="0">
               <a:buNone/>
-              <a:defRPr sz="2400">
+              <a:defRPr sz="756">
                 <a:solidFill>
                   <a:schemeClr val="tx1">
                     <a:tint val="75000"/>
@@ -1029,9 +1237,9 @@
                 </a:solidFill>
               </a:defRPr>
             </a:lvl1pPr>
-            <a:lvl2pPr marL="457200" indent="0">
-              <a:buNone/>
-              <a:defRPr sz="2000">
+            <a:lvl2pPr marL="144018" indent="0">
+              <a:buNone/>
+              <a:defRPr sz="630">
                 <a:solidFill>
                   <a:schemeClr val="tx1">
                     <a:tint val="75000"/>
@@ -1039,9 +1247,9 @@
                 </a:solidFill>
               </a:defRPr>
             </a:lvl2pPr>
-            <a:lvl3pPr marL="914400" indent="0">
-              <a:buNone/>
-              <a:defRPr sz="1800">
+            <a:lvl3pPr marL="288036" indent="0">
+              <a:buNone/>
+              <a:defRPr sz="567">
                 <a:solidFill>
                   <a:schemeClr val="tx1">
                     <a:tint val="75000"/>
@@ -1049,9 +1257,9 @@
                 </a:solidFill>
               </a:defRPr>
             </a:lvl3pPr>
-            <a:lvl4pPr marL="1371600" indent="0">
-              <a:buNone/>
-              <a:defRPr sz="1600">
+            <a:lvl4pPr marL="432054" indent="0">
+              <a:buNone/>
+              <a:defRPr sz="504">
                 <a:solidFill>
                   <a:schemeClr val="tx1">
                     <a:tint val="75000"/>
@@ -1059,9 +1267,9 @@
                 </a:solidFill>
               </a:defRPr>
             </a:lvl4pPr>
-            <a:lvl5pPr marL="1828800" indent="0">
-              <a:buNone/>
-              <a:defRPr sz="1600">
+            <a:lvl5pPr marL="576072" indent="0">
+              <a:buNone/>
+              <a:defRPr sz="504">
                 <a:solidFill>
                   <a:schemeClr val="tx1">
                     <a:tint val="75000"/>
@@ -1069,9 +1277,9 @@
                 </a:solidFill>
               </a:defRPr>
             </a:lvl5pPr>
-            <a:lvl6pPr marL="2286000" indent="0">
-              <a:buNone/>
-              <a:defRPr sz="1600">
+            <a:lvl6pPr marL="720090" indent="0">
+              <a:buNone/>
+              <a:defRPr sz="504">
                 <a:solidFill>
                   <a:schemeClr val="tx1">
                     <a:tint val="75000"/>
@@ -1079,9 +1287,9 @@
                 </a:solidFill>
               </a:defRPr>
             </a:lvl6pPr>
-            <a:lvl7pPr marL="2743200" indent="0">
-              <a:buNone/>
-              <a:defRPr sz="1600">
+            <a:lvl7pPr marL="864108" indent="0">
+              <a:buNone/>
+              <a:defRPr sz="504">
                 <a:solidFill>
                   <a:schemeClr val="tx1">
                     <a:tint val="75000"/>
@@ -1089,9 +1297,9 @@
                 </a:solidFill>
               </a:defRPr>
             </a:lvl7pPr>
-            <a:lvl8pPr marL="3200400" indent="0">
-              <a:buNone/>
-              <a:defRPr sz="1600">
+            <a:lvl8pPr marL="1008126" indent="0">
+              <a:buNone/>
+              <a:defRPr sz="504">
                 <a:solidFill>
                   <a:schemeClr val="tx1">
                     <a:tint val="75000"/>
@@ -1099,9 +1307,9 @@
                 </a:solidFill>
               </a:defRPr>
             </a:lvl8pPr>
-            <a:lvl9pPr marL="3657600" indent="0">
-              <a:buNone/>
-              <a:defRPr sz="1600">
+            <a:lvl9pPr marL="1152144" indent="0">
+              <a:buNone/>
+              <a:defRPr sz="504">
                 <a:solidFill>
                   <a:schemeClr val="tx1">
                     <a:tint val="75000"/>
@@ -1121,13 +1329,7 @@
       </p:sp>
       <p:sp>
         <p:nvSpPr>
-          <p:cNvPr id="4" name="Date Placeholder 3">
-            <a:extLst>
-              <a:ext uri="{FF2B5EF4-FFF2-40B4-BE49-F238E27FC236}">
-                <a16:creationId xmlns:a16="http://schemas.microsoft.com/office/drawing/2014/main" id="{5ABCB3E2-25C6-8E6D-5704-6E529BC5D549}"/>
-              </a:ext>
-            </a:extLst>
-          </p:cNvPr>
+          <p:cNvPr id="4" name="Date Placeholder 3"/>
           <p:cNvSpPr>
             <a:spLocks noGrp="1"/>
           </p:cNvSpPr>
@@ -1150,13 +1352,7 @@
       </p:sp>
       <p:sp>
         <p:nvSpPr>
-          <p:cNvPr id="5" name="Footer Placeholder 4">
-            <a:extLst>
-              <a:ext uri="{FF2B5EF4-FFF2-40B4-BE49-F238E27FC236}">
-                <a16:creationId xmlns:a16="http://schemas.microsoft.com/office/drawing/2014/main" id="{4233E5B5-386F-0391-B8D2-0E5FCB11F950}"/>
-              </a:ext>
-            </a:extLst>
-          </p:cNvPr>
+          <p:cNvPr id="5" name="Footer Placeholder 4"/>
           <p:cNvSpPr>
             <a:spLocks noGrp="1"/>
           </p:cNvSpPr>
@@ -1175,13 +1371,7 @@
       </p:sp>
       <p:sp>
         <p:nvSpPr>
-          <p:cNvPr id="6" name="Slide Number Placeholder 5">
-            <a:extLst>
-              <a:ext uri="{FF2B5EF4-FFF2-40B4-BE49-F238E27FC236}">
-                <a16:creationId xmlns:a16="http://schemas.microsoft.com/office/drawing/2014/main" id="{7F74D314-22DD-1078-CF38-C94A177A719C}"/>
-              </a:ext>
-            </a:extLst>
-          </p:cNvPr>
+          <p:cNvPr id="6" name="Slide Number Placeholder 5"/>
           <p:cNvSpPr>
             <a:spLocks noGrp="1"/>
           </p:cNvSpPr>
@@ -1205,7 +1395,7 @@
     </p:spTree>
     <p:extLst>
       <p:ext uri="{BB962C8B-B14F-4D97-AF65-F5344CB8AC3E}">
-        <p14:creationId xmlns:p14="http://schemas.microsoft.com/office/powerpoint/2010/main" val="797632875"/>
+        <p14:creationId xmlns:p14="http://schemas.microsoft.com/office/powerpoint/2010/main" val="287596655"/>
       </p:ext>
     </p:extLst>
   </p:cSld>
@@ -1234,13 +1424,7 @@
       </p:grpSpPr>
       <p:sp>
         <p:nvSpPr>
-          <p:cNvPr id="2" name="Title 1">
-            <a:extLst>
-              <a:ext uri="{FF2B5EF4-FFF2-40B4-BE49-F238E27FC236}">
-                <a16:creationId xmlns:a16="http://schemas.microsoft.com/office/drawing/2014/main" id="{9F59FA0E-61CB-F1A2-EA36-B5FDEAA050BC}"/>
-              </a:ext>
-            </a:extLst>
-          </p:cNvPr>
+          <p:cNvPr id="2" name="Title 1"/>
           <p:cNvSpPr>
             <a:spLocks noGrp="1"/>
           </p:cNvSpPr>
@@ -1257,19 +1441,13 @@
               <a:rPr lang="en-US"/>
               <a:t>Click to edit Master title style</a:t>
             </a:r>
-            <a:endParaRPr lang="nl-NL"/>
-          </a:p>
-        </p:txBody>
-      </p:sp>
-      <p:sp>
-        <p:nvSpPr>
-          <p:cNvPr id="3" name="Content Placeholder 2">
-            <a:extLst>
-              <a:ext uri="{FF2B5EF4-FFF2-40B4-BE49-F238E27FC236}">
-                <a16:creationId xmlns:a16="http://schemas.microsoft.com/office/drawing/2014/main" id="{EE95AA75-D470-294B-63FA-CDF31BBFE0E9}"/>
-              </a:ext>
-            </a:extLst>
-          </p:cNvPr>
+            <a:endParaRPr lang="en-US" dirty="0"/>
+          </a:p>
+        </p:txBody>
+      </p:sp>
+      <p:sp>
+        <p:nvSpPr>
+          <p:cNvPr id="3" name="Content Placeholder 2"/>
           <p:cNvSpPr>
             <a:spLocks noGrp="1"/>
           </p:cNvSpPr>
@@ -1279,8 +1457,8 @@
         </p:nvSpPr>
         <p:spPr>
           <a:xfrm>
-            <a:off x="838200" y="1825625"/>
-            <a:ext cx="5181600" cy="4351338"/>
+            <a:off x="618718" y="575157"/>
+            <a:ext cx="3824804" cy="1370873"/>
           </a:xfrm>
         </p:spPr>
         <p:txBody>
@@ -1320,19 +1498,13 @@
               <a:rPr lang="en-US"/>
               <a:t>Fifth level</a:t>
             </a:r>
-            <a:endParaRPr lang="nl-NL"/>
-          </a:p>
-        </p:txBody>
-      </p:sp>
-      <p:sp>
-        <p:nvSpPr>
-          <p:cNvPr id="4" name="Content Placeholder 3">
-            <a:extLst>
-              <a:ext uri="{FF2B5EF4-FFF2-40B4-BE49-F238E27FC236}">
-                <a16:creationId xmlns:a16="http://schemas.microsoft.com/office/drawing/2014/main" id="{11DC7B6D-82D6-CF92-2DA8-AFC9083483E2}"/>
-              </a:ext>
-            </a:extLst>
-          </p:cNvPr>
+            <a:endParaRPr lang="en-US" dirty="0"/>
+          </a:p>
+        </p:txBody>
+      </p:sp>
+      <p:sp>
+        <p:nvSpPr>
+          <p:cNvPr id="4" name="Content Placeholder 3"/>
           <p:cNvSpPr>
             <a:spLocks noGrp="1"/>
           </p:cNvSpPr>
@@ -1342,8 +1514,8 @@
         </p:nvSpPr>
         <p:spPr>
           <a:xfrm>
-            <a:off x="6172200" y="1825625"/>
-            <a:ext cx="5181600" cy="4351338"/>
+            <a:off x="4556016" y="575157"/>
+            <a:ext cx="3824804" cy="1370873"/>
           </a:xfrm>
         </p:spPr>
         <p:txBody>
@@ -1383,19 +1555,13 @@
               <a:rPr lang="en-US"/>
               <a:t>Fifth level</a:t>
             </a:r>
-            <a:endParaRPr lang="nl-NL"/>
-          </a:p>
-        </p:txBody>
-      </p:sp>
-      <p:sp>
-        <p:nvSpPr>
-          <p:cNvPr id="5" name="Date Placeholder 4">
-            <a:extLst>
-              <a:ext uri="{FF2B5EF4-FFF2-40B4-BE49-F238E27FC236}">
-                <a16:creationId xmlns:a16="http://schemas.microsoft.com/office/drawing/2014/main" id="{776E2C10-D9E2-EAA2-B994-132D40457DAD}"/>
-              </a:ext>
-            </a:extLst>
-          </p:cNvPr>
+            <a:endParaRPr lang="en-US" dirty="0"/>
+          </a:p>
+        </p:txBody>
+      </p:sp>
+      <p:sp>
+        <p:nvSpPr>
+          <p:cNvPr id="5" name="Date Placeholder 4"/>
           <p:cNvSpPr>
             <a:spLocks noGrp="1"/>
           </p:cNvSpPr>
@@ -1418,13 +1584,7 @@
       </p:sp>
       <p:sp>
         <p:nvSpPr>
-          <p:cNvPr id="6" name="Footer Placeholder 5">
-            <a:extLst>
-              <a:ext uri="{FF2B5EF4-FFF2-40B4-BE49-F238E27FC236}">
-                <a16:creationId xmlns:a16="http://schemas.microsoft.com/office/drawing/2014/main" id="{CDDD95B9-C566-5CC2-CD70-1DBAE54644B0}"/>
-              </a:ext>
-            </a:extLst>
-          </p:cNvPr>
+          <p:cNvPr id="6" name="Footer Placeholder 5"/>
           <p:cNvSpPr>
             <a:spLocks noGrp="1"/>
           </p:cNvSpPr>
@@ -1443,13 +1603,7 @@
       </p:sp>
       <p:sp>
         <p:nvSpPr>
-          <p:cNvPr id="7" name="Slide Number Placeholder 6">
-            <a:extLst>
-              <a:ext uri="{FF2B5EF4-FFF2-40B4-BE49-F238E27FC236}">
-                <a16:creationId xmlns:a16="http://schemas.microsoft.com/office/drawing/2014/main" id="{A7877609-A4EC-A6A3-B1F6-8DA4E746F91E}"/>
-              </a:ext>
-            </a:extLst>
-          </p:cNvPr>
+          <p:cNvPr id="7" name="Slide Number Placeholder 6"/>
           <p:cNvSpPr>
             <a:spLocks noGrp="1"/>
           </p:cNvSpPr>
@@ -1473,7 +1627,7 @@
     </p:spTree>
     <p:extLst>
       <p:ext uri="{BB962C8B-B14F-4D97-AF65-F5344CB8AC3E}">
-        <p14:creationId xmlns:p14="http://schemas.microsoft.com/office/powerpoint/2010/main" val="2884657002"/>
+        <p14:creationId xmlns:p14="http://schemas.microsoft.com/office/powerpoint/2010/main" val="3626373986"/>
       </p:ext>
     </p:extLst>
   </p:cSld>
@@ -1502,13 +1656,7 @@
       </p:grpSpPr>
       <p:sp>
         <p:nvSpPr>
-          <p:cNvPr id="2" name="Title 1">
-            <a:extLst>
-              <a:ext uri="{FF2B5EF4-FFF2-40B4-BE49-F238E27FC236}">
-                <a16:creationId xmlns:a16="http://schemas.microsoft.com/office/drawing/2014/main" id="{3E930693-A0F7-EA74-A2D5-44087BCD8F5E}"/>
-              </a:ext>
-            </a:extLst>
-          </p:cNvPr>
+          <p:cNvPr id="2" name="Title 1"/>
           <p:cNvSpPr>
             <a:spLocks noGrp="1"/>
           </p:cNvSpPr>
@@ -1518,8 +1666,8 @@
         </p:nvSpPr>
         <p:spPr>
           <a:xfrm>
-            <a:off x="839788" y="365125"/>
-            <a:ext cx="10515600" cy="1325563"/>
+            <a:off x="619890" y="115031"/>
+            <a:ext cx="7762102" cy="417614"/>
           </a:xfrm>
         </p:spPr>
         <p:txBody>
@@ -1530,19 +1678,13 @@
               <a:rPr lang="en-US"/>
               <a:t>Click to edit Master title style</a:t>
             </a:r>
-            <a:endParaRPr lang="nl-NL"/>
-          </a:p>
-        </p:txBody>
-      </p:sp>
-      <p:sp>
-        <p:nvSpPr>
-          <p:cNvPr id="3" name="Text Placeholder 2">
-            <a:extLst>
-              <a:ext uri="{FF2B5EF4-FFF2-40B4-BE49-F238E27FC236}">
-                <a16:creationId xmlns:a16="http://schemas.microsoft.com/office/drawing/2014/main" id="{12F05CA7-7F05-2591-3CD7-AE9A95B3613F}"/>
-              </a:ext>
-            </a:extLst>
-          </p:cNvPr>
+            <a:endParaRPr lang="en-US" dirty="0"/>
+          </a:p>
+        </p:txBody>
+      </p:sp>
+      <p:sp>
+        <p:nvSpPr>
+          <p:cNvPr id="3" name="Text Placeholder 2"/>
           <p:cNvSpPr>
             <a:spLocks noGrp="1"/>
           </p:cNvSpPr>
@@ -1552,8 +1694,8 @@
         </p:nvSpPr>
         <p:spPr>
           <a:xfrm>
-            <a:off x="839788" y="1681163"/>
-            <a:ext cx="5157787" cy="823912"/>
+            <a:off x="619891" y="529645"/>
+            <a:ext cx="3807226" cy="259570"/>
           </a:xfrm>
         </p:spPr>
         <p:txBody>
@@ -1561,39 +1703,39 @@
           <a:lstStyle>
             <a:lvl1pPr marL="0" indent="0">
               <a:buNone/>
-              <a:defRPr sz="2400" b="1"/>
+              <a:defRPr sz="756" b="1"/>
             </a:lvl1pPr>
-            <a:lvl2pPr marL="457200" indent="0">
-              <a:buNone/>
-              <a:defRPr sz="2000" b="1"/>
+            <a:lvl2pPr marL="144018" indent="0">
+              <a:buNone/>
+              <a:defRPr sz="630" b="1"/>
             </a:lvl2pPr>
-            <a:lvl3pPr marL="914400" indent="0">
-              <a:buNone/>
-              <a:defRPr sz="1800" b="1"/>
+            <a:lvl3pPr marL="288036" indent="0">
+              <a:buNone/>
+              <a:defRPr sz="567" b="1"/>
             </a:lvl3pPr>
-            <a:lvl4pPr marL="1371600" indent="0">
-              <a:buNone/>
-              <a:defRPr sz="1600" b="1"/>
+            <a:lvl4pPr marL="432054" indent="0">
+              <a:buNone/>
+              <a:defRPr sz="504" b="1"/>
             </a:lvl4pPr>
-            <a:lvl5pPr marL="1828800" indent="0">
-              <a:buNone/>
-              <a:defRPr sz="1600" b="1"/>
+            <a:lvl5pPr marL="576072" indent="0">
+              <a:buNone/>
+              <a:defRPr sz="504" b="1"/>
             </a:lvl5pPr>
-            <a:lvl6pPr marL="2286000" indent="0">
-              <a:buNone/>
-              <a:defRPr sz="1600" b="1"/>
+            <a:lvl6pPr marL="720090" indent="0">
+              <a:buNone/>
+              <a:defRPr sz="504" b="1"/>
             </a:lvl6pPr>
-            <a:lvl7pPr marL="2743200" indent="0">
-              <a:buNone/>
-              <a:defRPr sz="1600" b="1"/>
+            <a:lvl7pPr marL="864108" indent="0">
+              <a:buNone/>
+              <a:defRPr sz="504" b="1"/>
             </a:lvl7pPr>
-            <a:lvl8pPr marL="3200400" indent="0">
-              <a:buNone/>
-              <a:defRPr sz="1600" b="1"/>
+            <a:lvl8pPr marL="1008126" indent="0">
+              <a:buNone/>
+              <a:defRPr sz="504" b="1"/>
             </a:lvl8pPr>
-            <a:lvl9pPr marL="3657600" indent="0">
-              <a:buNone/>
-              <a:defRPr sz="1600" b="1"/>
+            <a:lvl9pPr marL="1152144" indent="0">
+              <a:buNone/>
+              <a:defRPr sz="504" b="1"/>
             </a:lvl9pPr>
           </a:lstStyle>
           <a:p>
@@ -1607,13 +1749,7 @@
       </p:sp>
       <p:sp>
         <p:nvSpPr>
-          <p:cNvPr id="4" name="Content Placeholder 3">
-            <a:extLst>
-              <a:ext uri="{FF2B5EF4-FFF2-40B4-BE49-F238E27FC236}">
-                <a16:creationId xmlns:a16="http://schemas.microsoft.com/office/drawing/2014/main" id="{F0B469F6-1A8C-70F4-EF36-BBD4FE50327E}"/>
-              </a:ext>
-            </a:extLst>
-          </p:cNvPr>
+          <p:cNvPr id="4" name="Content Placeholder 3"/>
           <p:cNvSpPr>
             <a:spLocks noGrp="1"/>
           </p:cNvSpPr>
@@ -1623,8 +1759,8 @@
         </p:nvSpPr>
         <p:spPr>
           <a:xfrm>
-            <a:off x="839788" y="2505075"/>
-            <a:ext cx="5157787" cy="3684588"/>
+            <a:off x="619891" y="789215"/>
+            <a:ext cx="3807226" cy="1160816"/>
           </a:xfrm>
         </p:spPr>
         <p:txBody>
@@ -1664,19 +1800,13 @@
               <a:rPr lang="en-US"/>
               <a:t>Fifth level</a:t>
             </a:r>
-            <a:endParaRPr lang="nl-NL"/>
-          </a:p>
-        </p:txBody>
-      </p:sp>
-      <p:sp>
-        <p:nvSpPr>
-          <p:cNvPr id="5" name="Text Placeholder 4">
-            <a:extLst>
-              <a:ext uri="{FF2B5EF4-FFF2-40B4-BE49-F238E27FC236}">
-                <a16:creationId xmlns:a16="http://schemas.microsoft.com/office/drawing/2014/main" id="{B6E85624-5D09-FCD7-7F24-ABF66DAEEB2D}"/>
-              </a:ext>
-            </a:extLst>
-          </p:cNvPr>
+            <a:endParaRPr lang="en-US" dirty="0"/>
+          </a:p>
+        </p:txBody>
+      </p:sp>
+      <p:sp>
+        <p:nvSpPr>
+          <p:cNvPr id="5" name="Text Placeholder 4"/>
           <p:cNvSpPr>
             <a:spLocks noGrp="1"/>
           </p:cNvSpPr>
@@ -1686,8 +1816,8 @@
         </p:nvSpPr>
         <p:spPr>
           <a:xfrm>
-            <a:off x="6172200" y="1681163"/>
-            <a:ext cx="5183188" cy="823912"/>
+            <a:off x="4556016" y="529645"/>
+            <a:ext cx="3825976" cy="259570"/>
           </a:xfrm>
         </p:spPr>
         <p:txBody>
@@ -1695,39 +1825,39 @@
           <a:lstStyle>
             <a:lvl1pPr marL="0" indent="0">
               <a:buNone/>
-              <a:defRPr sz="2400" b="1"/>
+              <a:defRPr sz="756" b="1"/>
             </a:lvl1pPr>
-            <a:lvl2pPr marL="457200" indent="0">
-              <a:buNone/>
-              <a:defRPr sz="2000" b="1"/>
+            <a:lvl2pPr marL="144018" indent="0">
+              <a:buNone/>
+              <a:defRPr sz="630" b="1"/>
             </a:lvl2pPr>
-            <a:lvl3pPr marL="914400" indent="0">
-              <a:buNone/>
-              <a:defRPr sz="1800" b="1"/>
+            <a:lvl3pPr marL="288036" indent="0">
+              <a:buNone/>
+              <a:defRPr sz="567" b="1"/>
             </a:lvl3pPr>
-            <a:lvl4pPr marL="1371600" indent="0">
-              <a:buNone/>
-              <a:defRPr sz="1600" b="1"/>
+            <a:lvl4pPr marL="432054" indent="0">
+              <a:buNone/>
+              <a:defRPr sz="504" b="1"/>
             </a:lvl4pPr>
-            <a:lvl5pPr marL="1828800" indent="0">
-              <a:buNone/>
-              <a:defRPr sz="1600" b="1"/>
+            <a:lvl5pPr marL="576072" indent="0">
+              <a:buNone/>
+              <a:defRPr sz="504" b="1"/>
             </a:lvl5pPr>
-            <a:lvl6pPr marL="2286000" indent="0">
-              <a:buNone/>
-              <a:defRPr sz="1600" b="1"/>
+            <a:lvl6pPr marL="720090" indent="0">
+              <a:buNone/>
+              <a:defRPr sz="504" b="1"/>
             </a:lvl6pPr>
-            <a:lvl7pPr marL="2743200" indent="0">
-              <a:buNone/>
-              <a:defRPr sz="1600" b="1"/>
+            <a:lvl7pPr marL="864108" indent="0">
+              <a:buNone/>
+              <a:defRPr sz="504" b="1"/>
             </a:lvl7pPr>
-            <a:lvl8pPr marL="3200400" indent="0">
-              <a:buNone/>
-              <a:defRPr sz="1600" b="1"/>
+            <a:lvl8pPr marL="1008126" indent="0">
+              <a:buNone/>
+              <a:defRPr sz="504" b="1"/>
             </a:lvl8pPr>
-            <a:lvl9pPr marL="3657600" indent="0">
-              <a:buNone/>
-              <a:defRPr sz="1600" b="1"/>
+            <a:lvl9pPr marL="1152144" indent="0">
+              <a:buNone/>
+              <a:defRPr sz="504" b="1"/>
             </a:lvl9pPr>
           </a:lstStyle>
           <a:p>
@@ -1741,13 +1871,7 @@
       </p:sp>
       <p:sp>
         <p:nvSpPr>
-          <p:cNvPr id="6" name="Content Placeholder 5">
-            <a:extLst>
-              <a:ext uri="{FF2B5EF4-FFF2-40B4-BE49-F238E27FC236}">
-                <a16:creationId xmlns:a16="http://schemas.microsoft.com/office/drawing/2014/main" id="{673F4F26-0F0F-96CF-99BA-68772F38B728}"/>
-              </a:ext>
-            </a:extLst>
-          </p:cNvPr>
+          <p:cNvPr id="6" name="Content Placeholder 5"/>
           <p:cNvSpPr>
             <a:spLocks noGrp="1"/>
           </p:cNvSpPr>
@@ -1757,8 +1881,8 @@
         </p:nvSpPr>
         <p:spPr>
           <a:xfrm>
-            <a:off x="6172200" y="2505075"/>
-            <a:ext cx="5183188" cy="3684588"/>
+            <a:off x="4556016" y="789215"/>
+            <a:ext cx="3825976" cy="1160816"/>
           </a:xfrm>
         </p:spPr>
         <p:txBody>
@@ -1798,19 +1922,13 @@
               <a:rPr lang="en-US"/>
               <a:t>Fifth level</a:t>
             </a:r>
-            <a:endParaRPr lang="nl-NL"/>
-          </a:p>
-        </p:txBody>
-      </p:sp>
-      <p:sp>
-        <p:nvSpPr>
-          <p:cNvPr id="7" name="Date Placeholder 6">
-            <a:extLst>
-              <a:ext uri="{FF2B5EF4-FFF2-40B4-BE49-F238E27FC236}">
-                <a16:creationId xmlns:a16="http://schemas.microsoft.com/office/drawing/2014/main" id="{889334C5-94F2-D83F-25AF-441A91525550}"/>
-              </a:ext>
-            </a:extLst>
-          </p:cNvPr>
+            <a:endParaRPr lang="en-US" dirty="0"/>
+          </a:p>
+        </p:txBody>
+      </p:sp>
+      <p:sp>
+        <p:nvSpPr>
+          <p:cNvPr id="7" name="Date Placeholder 6"/>
           <p:cNvSpPr>
             <a:spLocks noGrp="1"/>
           </p:cNvSpPr>
@@ -1833,13 +1951,7 @@
       </p:sp>
       <p:sp>
         <p:nvSpPr>
-          <p:cNvPr id="8" name="Footer Placeholder 7">
-            <a:extLst>
-              <a:ext uri="{FF2B5EF4-FFF2-40B4-BE49-F238E27FC236}">
-                <a16:creationId xmlns:a16="http://schemas.microsoft.com/office/drawing/2014/main" id="{B996EF75-9C7D-8439-3292-5D4638B1A979}"/>
-              </a:ext>
-            </a:extLst>
-          </p:cNvPr>
+          <p:cNvPr id="8" name="Footer Placeholder 7"/>
           <p:cNvSpPr>
             <a:spLocks noGrp="1"/>
           </p:cNvSpPr>
@@ -1858,13 +1970,7 @@
       </p:sp>
       <p:sp>
         <p:nvSpPr>
-          <p:cNvPr id="9" name="Slide Number Placeholder 8">
-            <a:extLst>
-              <a:ext uri="{FF2B5EF4-FFF2-40B4-BE49-F238E27FC236}">
-                <a16:creationId xmlns:a16="http://schemas.microsoft.com/office/drawing/2014/main" id="{FE60A327-15F8-F10E-599D-CEB362633FE0}"/>
-              </a:ext>
-            </a:extLst>
-          </p:cNvPr>
+          <p:cNvPr id="9" name="Slide Number Placeholder 8"/>
           <p:cNvSpPr>
             <a:spLocks noGrp="1"/>
           </p:cNvSpPr>
@@ -1888,7 +1994,7 @@
     </p:spTree>
     <p:extLst>
       <p:ext uri="{BB962C8B-B14F-4D97-AF65-F5344CB8AC3E}">
-        <p14:creationId xmlns:p14="http://schemas.microsoft.com/office/powerpoint/2010/main" val="2600747089"/>
+        <p14:creationId xmlns:p14="http://schemas.microsoft.com/office/powerpoint/2010/main" val="3871201088"/>
       </p:ext>
     </p:extLst>
   </p:cSld>
@@ -1917,13 +2023,7 @@
       </p:grpSpPr>
       <p:sp>
         <p:nvSpPr>
-          <p:cNvPr id="2" name="Title 1">
-            <a:extLst>
-              <a:ext uri="{FF2B5EF4-FFF2-40B4-BE49-F238E27FC236}">
-                <a16:creationId xmlns:a16="http://schemas.microsoft.com/office/drawing/2014/main" id="{F1DA8F9A-BE7C-4996-181B-647192F52CFA}"/>
-              </a:ext>
-            </a:extLst>
-          </p:cNvPr>
+          <p:cNvPr id="2" name="Title 1"/>
           <p:cNvSpPr>
             <a:spLocks noGrp="1"/>
           </p:cNvSpPr>
@@ -1940,19 +2040,13 @@
               <a:rPr lang="en-US"/>
               <a:t>Click to edit Master title style</a:t>
             </a:r>
-            <a:endParaRPr lang="nl-NL"/>
-          </a:p>
-        </p:txBody>
-      </p:sp>
-      <p:sp>
-        <p:nvSpPr>
-          <p:cNvPr id="3" name="Date Placeholder 2">
-            <a:extLst>
-              <a:ext uri="{FF2B5EF4-FFF2-40B4-BE49-F238E27FC236}">
-                <a16:creationId xmlns:a16="http://schemas.microsoft.com/office/drawing/2014/main" id="{6E1A7DBF-6247-835D-E824-572D0409F675}"/>
-              </a:ext>
-            </a:extLst>
-          </p:cNvPr>
+            <a:endParaRPr lang="en-US" dirty="0"/>
+          </a:p>
+        </p:txBody>
+      </p:sp>
+      <p:sp>
+        <p:nvSpPr>
+          <p:cNvPr id="3" name="Date Placeholder 2"/>
           <p:cNvSpPr>
             <a:spLocks noGrp="1"/>
           </p:cNvSpPr>
@@ -1975,13 +2069,7 @@
       </p:sp>
       <p:sp>
         <p:nvSpPr>
-          <p:cNvPr id="4" name="Footer Placeholder 3">
-            <a:extLst>
-              <a:ext uri="{FF2B5EF4-FFF2-40B4-BE49-F238E27FC236}">
-                <a16:creationId xmlns:a16="http://schemas.microsoft.com/office/drawing/2014/main" id="{3FB04A1B-CAA3-7BA7-87BB-CF00079BD712}"/>
-              </a:ext>
-            </a:extLst>
-          </p:cNvPr>
+          <p:cNvPr id="4" name="Footer Placeholder 3"/>
           <p:cNvSpPr>
             <a:spLocks noGrp="1"/>
           </p:cNvSpPr>
@@ -2000,13 +2088,7 @@
       </p:sp>
       <p:sp>
         <p:nvSpPr>
-          <p:cNvPr id="5" name="Slide Number Placeholder 4">
-            <a:extLst>
-              <a:ext uri="{FF2B5EF4-FFF2-40B4-BE49-F238E27FC236}">
-                <a16:creationId xmlns:a16="http://schemas.microsoft.com/office/drawing/2014/main" id="{8EC02520-72CA-3643-67A5-7A4B3048AC47}"/>
-              </a:ext>
-            </a:extLst>
-          </p:cNvPr>
+          <p:cNvPr id="5" name="Slide Number Placeholder 4"/>
           <p:cNvSpPr>
             <a:spLocks noGrp="1"/>
           </p:cNvSpPr>
@@ -2030,7 +2112,7 @@
     </p:spTree>
     <p:extLst>
       <p:ext uri="{BB962C8B-B14F-4D97-AF65-F5344CB8AC3E}">
-        <p14:creationId xmlns:p14="http://schemas.microsoft.com/office/powerpoint/2010/main" val="141713139"/>
+        <p14:creationId xmlns:p14="http://schemas.microsoft.com/office/powerpoint/2010/main" val="2280448685"/>
       </p:ext>
     </p:extLst>
   </p:cSld>
@@ -2059,13 +2141,7 @@
       </p:grpSpPr>
       <p:sp>
         <p:nvSpPr>
-          <p:cNvPr id="2" name="Date Placeholder 1">
-            <a:extLst>
-              <a:ext uri="{FF2B5EF4-FFF2-40B4-BE49-F238E27FC236}">
-                <a16:creationId xmlns:a16="http://schemas.microsoft.com/office/drawing/2014/main" id="{B0FF7256-3762-CF8D-B255-6F22ADB2A2D3}"/>
-              </a:ext>
-            </a:extLst>
-          </p:cNvPr>
+          <p:cNvPr id="2" name="Date Placeholder 1"/>
           <p:cNvSpPr>
             <a:spLocks noGrp="1"/>
           </p:cNvSpPr>
@@ -2088,13 +2164,7 @@
       </p:sp>
       <p:sp>
         <p:nvSpPr>
-          <p:cNvPr id="3" name="Footer Placeholder 2">
-            <a:extLst>
-              <a:ext uri="{FF2B5EF4-FFF2-40B4-BE49-F238E27FC236}">
-                <a16:creationId xmlns:a16="http://schemas.microsoft.com/office/drawing/2014/main" id="{0D7F575A-89BC-A250-219D-B3907D9F99DA}"/>
-              </a:ext>
-            </a:extLst>
-          </p:cNvPr>
+          <p:cNvPr id="3" name="Footer Placeholder 2"/>
           <p:cNvSpPr>
             <a:spLocks noGrp="1"/>
           </p:cNvSpPr>
@@ -2113,13 +2183,7 @@
       </p:sp>
       <p:sp>
         <p:nvSpPr>
-          <p:cNvPr id="4" name="Slide Number Placeholder 3">
-            <a:extLst>
-              <a:ext uri="{FF2B5EF4-FFF2-40B4-BE49-F238E27FC236}">
-                <a16:creationId xmlns:a16="http://schemas.microsoft.com/office/drawing/2014/main" id="{8BC6F8BF-6161-F1BC-BD37-9790071EFCEF}"/>
-              </a:ext>
-            </a:extLst>
-          </p:cNvPr>
+          <p:cNvPr id="4" name="Slide Number Placeholder 3"/>
           <p:cNvSpPr>
             <a:spLocks noGrp="1"/>
           </p:cNvSpPr>
@@ -2143,7 +2207,7 @@
     </p:spTree>
     <p:extLst>
       <p:ext uri="{BB962C8B-B14F-4D97-AF65-F5344CB8AC3E}">
-        <p14:creationId xmlns:p14="http://schemas.microsoft.com/office/powerpoint/2010/main" val="1718218583"/>
+        <p14:creationId xmlns:p14="http://schemas.microsoft.com/office/powerpoint/2010/main" val="2653705896"/>
       </p:ext>
     </p:extLst>
   </p:cSld>
@@ -2172,13 +2236,7 @@
       </p:grpSpPr>
       <p:sp>
         <p:nvSpPr>
-          <p:cNvPr id="2" name="Title 1">
-            <a:extLst>
-              <a:ext uri="{FF2B5EF4-FFF2-40B4-BE49-F238E27FC236}">
-                <a16:creationId xmlns:a16="http://schemas.microsoft.com/office/drawing/2014/main" id="{E3C0CFE5-53E3-3AED-D0F7-880242578F5F}"/>
-              </a:ext>
-            </a:extLst>
-          </p:cNvPr>
+          <p:cNvPr id="2" name="Title 1"/>
           <p:cNvSpPr>
             <a:spLocks noGrp="1"/>
           </p:cNvSpPr>
@@ -2188,15 +2246,15 @@
         </p:nvSpPr>
         <p:spPr>
           <a:xfrm>
-            <a:off x="839788" y="457200"/>
-            <a:ext cx="3932237" cy="1600200"/>
+            <a:off x="619891" y="144039"/>
+            <a:ext cx="2902585" cy="504137"/>
           </a:xfrm>
         </p:spPr>
         <p:txBody>
           <a:bodyPr anchor="b"/>
           <a:lstStyle>
             <a:lvl1pPr>
-              <a:defRPr sz="3200"/>
+              <a:defRPr sz="1008"/>
             </a:lvl1pPr>
           </a:lstStyle>
           <a:p>
@@ -2204,19 +2262,13 @@
               <a:rPr lang="en-US"/>
               <a:t>Click to edit Master title style</a:t>
             </a:r>
-            <a:endParaRPr lang="nl-NL"/>
-          </a:p>
-        </p:txBody>
-      </p:sp>
-      <p:sp>
-        <p:nvSpPr>
-          <p:cNvPr id="3" name="Content Placeholder 2">
-            <a:extLst>
-              <a:ext uri="{FF2B5EF4-FFF2-40B4-BE49-F238E27FC236}">
-                <a16:creationId xmlns:a16="http://schemas.microsoft.com/office/drawing/2014/main" id="{75FDE97F-DEA7-810A-93F7-21B8FA7E9ABB}"/>
-              </a:ext>
-            </a:extLst>
-          </p:cNvPr>
+            <a:endParaRPr lang="en-US" dirty="0"/>
+          </a:p>
+        </p:txBody>
+      </p:sp>
+      <p:sp>
+        <p:nvSpPr>
+          <p:cNvPr id="3" name="Content Placeholder 2"/>
           <p:cNvSpPr>
             <a:spLocks noGrp="1"/>
           </p:cNvSpPr>
@@ -2226,39 +2278,39 @@
         </p:nvSpPr>
         <p:spPr>
           <a:xfrm>
-            <a:off x="5183188" y="987425"/>
-            <a:ext cx="6172200" cy="4873625"/>
+            <a:off x="3825976" y="311085"/>
+            <a:ext cx="4556016" cy="1535418"/>
           </a:xfrm>
         </p:spPr>
         <p:txBody>
           <a:bodyPr/>
           <a:lstStyle>
             <a:lvl1pPr>
-              <a:defRPr sz="3200"/>
+              <a:defRPr sz="1008"/>
             </a:lvl1pPr>
             <a:lvl2pPr>
-              <a:defRPr sz="2800"/>
+              <a:defRPr sz="882"/>
             </a:lvl2pPr>
             <a:lvl3pPr>
-              <a:defRPr sz="2400"/>
+              <a:defRPr sz="756"/>
             </a:lvl3pPr>
             <a:lvl4pPr>
-              <a:defRPr sz="2000"/>
+              <a:defRPr sz="630"/>
             </a:lvl4pPr>
             <a:lvl5pPr>
-              <a:defRPr sz="2000"/>
+              <a:defRPr sz="630"/>
             </a:lvl5pPr>
             <a:lvl6pPr>
-              <a:defRPr sz="2000"/>
+              <a:defRPr sz="630"/>
             </a:lvl6pPr>
             <a:lvl7pPr>
-              <a:defRPr sz="2000"/>
+              <a:defRPr sz="630"/>
             </a:lvl7pPr>
             <a:lvl8pPr>
-              <a:defRPr sz="2000"/>
+              <a:defRPr sz="630"/>
             </a:lvl8pPr>
             <a:lvl9pPr>
-              <a:defRPr sz="2000"/>
+              <a:defRPr sz="630"/>
             </a:lvl9pPr>
           </a:lstStyle>
           <a:p>
@@ -2295,19 +2347,13 @@
               <a:rPr lang="en-US"/>
               <a:t>Fifth level</a:t>
             </a:r>
-            <a:endParaRPr lang="nl-NL"/>
-          </a:p>
-        </p:txBody>
-      </p:sp>
-      <p:sp>
-        <p:nvSpPr>
-          <p:cNvPr id="4" name="Text Placeholder 3">
-            <a:extLst>
-              <a:ext uri="{FF2B5EF4-FFF2-40B4-BE49-F238E27FC236}">
-                <a16:creationId xmlns:a16="http://schemas.microsoft.com/office/drawing/2014/main" id="{A94255D5-62B5-178F-FD00-652216F7B803}"/>
-              </a:ext>
-            </a:extLst>
-          </p:cNvPr>
+            <a:endParaRPr lang="en-US" dirty="0"/>
+          </a:p>
+        </p:txBody>
+      </p:sp>
+      <p:sp>
+        <p:nvSpPr>
+          <p:cNvPr id="4" name="Text Placeholder 3"/>
           <p:cNvSpPr>
             <a:spLocks noGrp="1"/>
           </p:cNvSpPr>
@@ -2317,8 +2363,8 @@
         </p:nvSpPr>
         <p:spPr>
           <a:xfrm>
-            <a:off x="839788" y="2057400"/>
-            <a:ext cx="3932237" cy="3811588"/>
+            <a:off x="619891" y="648176"/>
+            <a:ext cx="2902585" cy="1200827"/>
           </a:xfrm>
         </p:spPr>
         <p:txBody>
@@ -2326,39 +2372,39 @@
           <a:lstStyle>
             <a:lvl1pPr marL="0" indent="0">
               <a:buNone/>
-              <a:defRPr sz="1600"/>
+              <a:defRPr sz="504"/>
             </a:lvl1pPr>
-            <a:lvl2pPr marL="457200" indent="0">
-              <a:buNone/>
-              <a:defRPr sz="1400"/>
+            <a:lvl2pPr marL="144018" indent="0">
+              <a:buNone/>
+              <a:defRPr sz="441"/>
             </a:lvl2pPr>
-            <a:lvl3pPr marL="914400" indent="0">
-              <a:buNone/>
-              <a:defRPr sz="1200"/>
+            <a:lvl3pPr marL="288036" indent="0">
+              <a:buNone/>
+              <a:defRPr sz="378"/>
             </a:lvl3pPr>
-            <a:lvl4pPr marL="1371600" indent="0">
-              <a:buNone/>
-              <a:defRPr sz="1000"/>
+            <a:lvl4pPr marL="432054" indent="0">
+              <a:buNone/>
+              <a:defRPr sz="315"/>
             </a:lvl4pPr>
-            <a:lvl5pPr marL="1828800" indent="0">
-              <a:buNone/>
-              <a:defRPr sz="1000"/>
+            <a:lvl5pPr marL="576072" indent="0">
+              <a:buNone/>
+              <a:defRPr sz="315"/>
             </a:lvl5pPr>
-            <a:lvl6pPr marL="2286000" indent="0">
-              <a:buNone/>
-              <a:defRPr sz="1000"/>
+            <a:lvl6pPr marL="720090" indent="0">
+              <a:buNone/>
+              <a:defRPr sz="315"/>
             </a:lvl6pPr>
-            <a:lvl7pPr marL="2743200" indent="0">
-              <a:buNone/>
-              <a:defRPr sz="1000"/>
+            <a:lvl7pPr marL="864108" indent="0">
+              <a:buNone/>
+              <a:defRPr sz="315"/>
             </a:lvl7pPr>
-            <a:lvl8pPr marL="3200400" indent="0">
-              <a:buNone/>
-              <a:defRPr sz="1000"/>
+            <a:lvl8pPr marL="1008126" indent="0">
+              <a:buNone/>
+              <a:defRPr sz="315"/>
             </a:lvl8pPr>
-            <a:lvl9pPr marL="3657600" indent="0">
-              <a:buNone/>
-              <a:defRPr sz="1000"/>
+            <a:lvl9pPr marL="1152144" indent="0">
+              <a:buNone/>
+              <a:defRPr sz="315"/>
             </a:lvl9pPr>
           </a:lstStyle>
           <a:p>
@@ -2372,13 +2418,7 @@
       </p:sp>
       <p:sp>
         <p:nvSpPr>
-          <p:cNvPr id="5" name="Date Placeholder 4">
-            <a:extLst>
-              <a:ext uri="{FF2B5EF4-FFF2-40B4-BE49-F238E27FC236}">
-                <a16:creationId xmlns:a16="http://schemas.microsoft.com/office/drawing/2014/main" id="{47F30A16-9CE0-5937-CBE7-FF024CA2363F}"/>
-              </a:ext>
-            </a:extLst>
-          </p:cNvPr>
+          <p:cNvPr id="5" name="Date Placeholder 4"/>
           <p:cNvSpPr>
             <a:spLocks noGrp="1"/>
           </p:cNvSpPr>
@@ -2401,13 +2441,7 @@
       </p:sp>
       <p:sp>
         <p:nvSpPr>
-          <p:cNvPr id="6" name="Footer Placeholder 5">
-            <a:extLst>
-              <a:ext uri="{FF2B5EF4-FFF2-40B4-BE49-F238E27FC236}">
-                <a16:creationId xmlns:a16="http://schemas.microsoft.com/office/drawing/2014/main" id="{33B3E22E-E0E2-351E-A321-355F03F25498}"/>
-              </a:ext>
-            </a:extLst>
-          </p:cNvPr>
+          <p:cNvPr id="6" name="Footer Placeholder 5"/>
           <p:cNvSpPr>
             <a:spLocks noGrp="1"/>
           </p:cNvSpPr>
@@ -2426,13 +2460,7 @@
       </p:sp>
       <p:sp>
         <p:nvSpPr>
-          <p:cNvPr id="7" name="Slide Number Placeholder 6">
-            <a:extLst>
-              <a:ext uri="{FF2B5EF4-FFF2-40B4-BE49-F238E27FC236}">
-                <a16:creationId xmlns:a16="http://schemas.microsoft.com/office/drawing/2014/main" id="{D7A0C545-8C29-A3BC-A0B8-9D69BC702B46}"/>
-              </a:ext>
-            </a:extLst>
-          </p:cNvPr>
+          <p:cNvPr id="7" name="Slide Number Placeholder 6"/>
           <p:cNvSpPr>
             <a:spLocks noGrp="1"/>
           </p:cNvSpPr>
@@ -2456,7 +2484,7 @@
     </p:spTree>
     <p:extLst>
       <p:ext uri="{BB962C8B-B14F-4D97-AF65-F5344CB8AC3E}">
-        <p14:creationId xmlns:p14="http://schemas.microsoft.com/office/powerpoint/2010/main" val="687012723"/>
+        <p14:creationId xmlns:p14="http://schemas.microsoft.com/office/powerpoint/2010/main" val="2528084322"/>
       </p:ext>
     </p:extLst>
   </p:cSld>
@@ -2485,13 +2513,7 @@
       </p:grpSpPr>
       <p:sp>
         <p:nvSpPr>
-          <p:cNvPr id="2" name="Title 1">
-            <a:extLst>
-              <a:ext uri="{FF2B5EF4-FFF2-40B4-BE49-F238E27FC236}">
-                <a16:creationId xmlns:a16="http://schemas.microsoft.com/office/drawing/2014/main" id="{4869E7A3-45B3-0D6B-F95C-DABA64B618C6}"/>
-              </a:ext>
-            </a:extLst>
-          </p:cNvPr>
+          <p:cNvPr id="2" name="Title 1"/>
           <p:cNvSpPr>
             <a:spLocks noGrp="1"/>
           </p:cNvSpPr>
@@ -2501,15 +2523,15 @@
         </p:nvSpPr>
         <p:spPr>
           <a:xfrm>
-            <a:off x="839788" y="457200"/>
-            <a:ext cx="3932237" cy="1600200"/>
+            <a:off x="619891" y="144039"/>
+            <a:ext cx="2902585" cy="504137"/>
           </a:xfrm>
         </p:spPr>
         <p:txBody>
           <a:bodyPr anchor="b"/>
           <a:lstStyle>
             <a:lvl1pPr>
-              <a:defRPr sz="3200"/>
+              <a:defRPr sz="1008"/>
             </a:lvl1pPr>
           </a:lstStyle>
           <a:p>
@@ -2517,21 +2539,15 @@
               <a:rPr lang="en-US"/>
               <a:t>Click to edit Master title style</a:t>
             </a:r>
-            <a:endParaRPr lang="nl-NL"/>
-          </a:p>
-        </p:txBody>
-      </p:sp>
-      <p:sp>
-        <p:nvSpPr>
-          <p:cNvPr id="3" name="Picture Placeholder 2">
-            <a:extLst>
-              <a:ext uri="{FF2B5EF4-FFF2-40B4-BE49-F238E27FC236}">
-                <a16:creationId xmlns:a16="http://schemas.microsoft.com/office/drawing/2014/main" id="{8AD4A502-085B-3BB9-8377-6D7CA22790CE}"/>
-              </a:ext>
-            </a:extLst>
-          </p:cNvPr>
-          <p:cNvSpPr>
-            <a:spLocks noGrp="1"/>
+            <a:endParaRPr lang="en-US" dirty="0"/>
+          </a:p>
+        </p:txBody>
+      </p:sp>
+      <p:sp>
+        <p:nvSpPr>
+          <p:cNvPr id="3" name="Picture Placeholder 2"/>
+          <p:cNvSpPr>
+            <a:spLocks noGrp="1" noChangeAspect="1"/>
           </p:cNvSpPr>
           <p:nvPr>
             <p:ph type="pic" idx="1"/>
@@ -2539,64 +2555,62 @@
         </p:nvSpPr>
         <p:spPr>
           <a:xfrm>
-            <a:off x="5183188" y="987425"/>
-            <a:ext cx="6172200" cy="4873625"/>
+            <a:off x="3825976" y="311085"/>
+            <a:ext cx="4556016" cy="1535418"/>
           </a:xfrm>
         </p:spPr>
         <p:txBody>
-          <a:bodyPr/>
+          <a:bodyPr anchor="t"/>
           <a:lstStyle>
             <a:lvl1pPr marL="0" indent="0">
               <a:buNone/>
-              <a:defRPr sz="3200"/>
+              <a:defRPr sz="1008"/>
             </a:lvl1pPr>
-            <a:lvl2pPr marL="457200" indent="0">
-              <a:buNone/>
-              <a:defRPr sz="2800"/>
+            <a:lvl2pPr marL="144018" indent="0">
+              <a:buNone/>
+              <a:defRPr sz="882"/>
             </a:lvl2pPr>
-            <a:lvl3pPr marL="914400" indent="0">
-              <a:buNone/>
-              <a:defRPr sz="2400"/>
+            <a:lvl3pPr marL="288036" indent="0">
+              <a:buNone/>
+              <a:defRPr sz="756"/>
             </a:lvl3pPr>
-            <a:lvl4pPr marL="1371600" indent="0">
-              <a:buNone/>
-              <a:defRPr sz="2000"/>
+            <a:lvl4pPr marL="432054" indent="0">
+              <a:buNone/>
+              <a:defRPr sz="630"/>
             </a:lvl4pPr>
-            <a:lvl5pPr marL="1828800" indent="0">
-              <a:buNone/>
-              <a:defRPr sz="2000"/>
+            <a:lvl5pPr marL="576072" indent="0">
+              <a:buNone/>
+              <a:defRPr sz="630"/>
             </a:lvl5pPr>
-            <a:lvl6pPr marL="2286000" indent="0">
-              <a:buNone/>
-              <a:defRPr sz="2000"/>
+            <a:lvl6pPr marL="720090" indent="0">
+              <a:buNone/>
+              <a:defRPr sz="630"/>
             </a:lvl6pPr>
-            <a:lvl7pPr marL="2743200" indent="0">
-              <a:buNone/>
-              <a:defRPr sz="2000"/>
+            <a:lvl7pPr marL="864108" indent="0">
+              <a:buNone/>
+              <a:defRPr sz="630"/>
             </a:lvl7pPr>
-            <a:lvl8pPr marL="3200400" indent="0">
-              <a:buNone/>
-              <a:defRPr sz="2000"/>
+            <a:lvl8pPr marL="1008126" indent="0">
+              <a:buNone/>
+              <a:defRPr sz="630"/>
             </a:lvl8pPr>
-            <a:lvl9pPr marL="3657600" indent="0">
-              <a:buNone/>
-              <a:defRPr sz="2000"/>
+            <a:lvl9pPr marL="1152144" indent="0">
+              <a:buNone/>
+              <a:defRPr sz="630"/>
             </a:lvl9pPr>
           </a:lstStyle>
           <a:p>
-            <a:endParaRPr lang="nl-NL"/>
-          </a:p>
-        </p:txBody>
-      </p:sp>
-      <p:sp>
-        <p:nvSpPr>
-          <p:cNvPr id="4" name="Text Placeholder 3">
-            <a:extLst>
-              <a:ext uri="{FF2B5EF4-FFF2-40B4-BE49-F238E27FC236}">
-                <a16:creationId xmlns:a16="http://schemas.microsoft.com/office/drawing/2014/main" id="{35372F4A-CEB4-1DC4-EBEA-EF37A07ECDEC}"/>
-              </a:ext>
-            </a:extLst>
-          </p:cNvPr>
+            <a:r>
+              <a:rPr lang="en-US"/>
+              <a:t>Click icon to add picture</a:t>
+            </a:r>
+            <a:endParaRPr lang="en-US" dirty="0"/>
+          </a:p>
+        </p:txBody>
+      </p:sp>
+      <p:sp>
+        <p:nvSpPr>
+          <p:cNvPr id="4" name="Text Placeholder 3"/>
           <p:cNvSpPr>
             <a:spLocks noGrp="1"/>
           </p:cNvSpPr>
@@ -2606,8 +2620,8 @@
         </p:nvSpPr>
         <p:spPr>
           <a:xfrm>
-            <a:off x="839788" y="2057400"/>
-            <a:ext cx="3932237" cy="3811588"/>
+            <a:off x="619891" y="648176"/>
+            <a:ext cx="2902585" cy="1200827"/>
           </a:xfrm>
         </p:spPr>
         <p:txBody>
@@ -2615,39 +2629,39 @@
           <a:lstStyle>
             <a:lvl1pPr marL="0" indent="0">
               <a:buNone/>
-              <a:defRPr sz="1600"/>
+              <a:defRPr sz="504"/>
             </a:lvl1pPr>
-            <a:lvl2pPr marL="457200" indent="0">
-              <a:buNone/>
-              <a:defRPr sz="1400"/>
+            <a:lvl2pPr marL="144018" indent="0">
+              <a:buNone/>
+              <a:defRPr sz="441"/>
             </a:lvl2pPr>
-            <a:lvl3pPr marL="914400" indent="0">
-              <a:buNone/>
-              <a:defRPr sz="1200"/>
+            <a:lvl3pPr marL="288036" indent="0">
+              <a:buNone/>
+              <a:defRPr sz="378"/>
             </a:lvl3pPr>
-            <a:lvl4pPr marL="1371600" indent="0">
-              <a:buNone/>
-              <a:defRPr sz="1000"/>
+            <a:lvl4pPr marL="432054" indent="0">
+              <a:buNone/>
+              <a:defRPr sz="315"/>
             </a:lvl4pPr>
-            <a:lvl5pPr marL="1828800" indent="0">
-              <a:buNone/>
-              <a:defRPr sz="1000"/>
+            <a:lvl5pPr marL="576072" indent="0">
+              <a:buNone/>
+              <a:defRPr sz="315"/>
             </a:lvl5pPr>
-            <a:lvl6pPr marL="2286000" indent="0">
-              <a:buNone/>
-              <a:defRPr sz="1000"/>
+            <a:lvl6pPr marL="720090" indent="0">
+              <a:buNone/>
+              <a:defRPr sz="315"/>
             </a:lvl6pPr>
-            <a:lvl7pPr marL="2743200" indent="0">
-              <a:buNone/>
-              <a:defRPr sz="1000"/>
+            <a:lvl7pPr marL="864108" indent="0">
+              <a:buNone/>
+              <a:defRPr sz="315"/>
             </a:lvl7pPr>
-            <a:lvl8pPr marL="3200400" indent="0">
-              <a:buNone/>
-              <a:defRPr sz="1000"/>
+            <a:lvl8pPr marL="1008126" indent="0">
+              <a:buNone/>
+              <a:defRPr sz="315"/>
             </a:lvl8pPr>
-            <a:lvl9pPr marL="3657600" indent="0">
-              <a:buNone/>
-              <a:defRPr sz="1000"/>
+            <a:lvl9pPr marL="1152144" indent="0">
+              <a:buNone/>
+              <a:defRPr sz="315"/>
             </a:lvl9pPr>
           </a:lstStyle>
           <a:p>
@@ -2661,13 +2675,7 @@
       </p:sp>
       <p:sp>
         <p:nvSpPr>
-          <p:cNvPr id="5" name="Date Placeholder 4">
-            <a:extLst>
-              <a:ext uri="{FF2B5EF4-FFF2-40B4-BE49-F238E27FC236}">
-                <a16:creationId xmlns:a16="http://schemas.microsoft.com/office/drawing/2014/main" id="{9CA92B0C-8370-1E4A-48D1-19CAABD1C421}"/>
-              </a:ext>
-            </a:extLst>
-          </p:cNvPr>
+          <p:cNvPr id="5" name="Date Placeholder 4"/>
           <p:cNvSpPr>
             <a:spLocks noGrp="1"/>
           </p:cNvSpPr>
@@ -2690,13 +2698,7 @@
       </p:sp>
       <p:sp>
         <p:nvSpPr>
-          <p:cNvPr id="6" name="Footer Placeholder 5">
-            <a:extLst>
-              <a:ext uri="{FF2B5EF4-FFF2-40B4-BE49-F238E27FC236}">
-                <a16:creationId xmlns:a16="http://schemas.microsoft.com/office/drawing/2014/main" id="{00074554-CF32-7EEA-4ABE-3F60CC57BE00}"/>
-              </a:ext>
-            </a:extLst>
-          </p:cNvPr>
+          <p:cNvPr id="6" name="Footer Placeholder 5"/>
           <p:cNvSpPr>
             <a:spLocks noGrp="1"/>
           </p:cNvSpPr>
@@ -2715,13 +2717,7 @@
       </p:sp>
       <p:sp>
         <p:nvSpPr>
-          <p:cNvPr id="7" name="Slide Number Placeholder 6">
-            <a:extLst>
-              <a:ext uri="{FF2B5EF4-FFF2-40B4-BE49-F238E27FC236}">
-                <a16:creationId xmlns:a16="http://schemas.microsoft.com/office/drawing/2014/main" id="{C886F73E-C334-184E-055E-4E4D22B93655}"/>
-              </a:ext>
-            </a:extLst>
-          </p:cNvPr>
+          <p:cNvPr id="7" name="Slide Number Placeholder 6"/>
           <p:cNvSpPr>
             <a:spLocks noGrp="1"/>
           </p:cNvSpPr>
@@ -2745,7 +2741,7 @@
     </p:spTree>
     <p:extLst>
       <p:ext uri="{BB962C8B-B14F-4D97-AF65-F5344CB8AC3E}">
-        <p14:creationId xmlns:p14="http://schemas.microsoft.com/office/powerpoint/2010/main" val="1039521961"/>
+        <p14:creationId xmlns:p14="http://schemas.microsoft.com/office/powerpoint/2010/main" val="3754461881"/>
       </p:ext>
     </p:extLst>
   </p:cSld>
@@ -2779,13 +2775,7 @@
       </p:grpSpPr>
       <p:sp>
         <p:nvSpPr>
-          <p:cNvPr id="2" name="Title Placeholder 1">
-            <a:extLst>
-              <a:ext uri="{FF2B5EF4-FFF2-40B4-BE49-F238E27FC236}">
-                <a16:creationId xmlns:a16="http://schemas.microsoft.com/office/drawing/2014/main" id="{7246146C-2E37-031B-02EA-8CEE89F81F45}"/>
-              </a:ext>
-            </a:extLst>
-          </p:cNvPr>
+          <p:cNvPr id="2" name="Title Placeholder 1"/>
           <p:cNvSpPr>
             <a:spLocks noGrp="1"/>
           </p:cNvSpPr>
@@ -2795,8 +2785,8 @@
         </p:nvSpPr>
         <p:spPr>
           <a:xfrm>
-            <a:off x="838200" y="365125"/>
-            <a:ext cx="10515600" cy="1325563"/>
+            <a:off x="618718" y="115031"/>
+            <a:ext cx="7762102" cy="417614"/>
           </a:xfrm>
           <a:prstGeom prst="rect">
             <a:avLst/>
@@ -2812,19 +2802,13 @@
               <a:rPr lang="en-US"/>
               <a:t>Click to edit Master title style</a:t>
             </a:r>
-            <a:endParaRPr lang="nl-NL"/>
-          </a:p>
-        </p:txBody>
-      </p:sp>
-      <p:sp>
-        <p:nvSpPr>
-          <p:cNvPr id="3" name="Text Placeholder 2">
-            <a:extLst>
-              <a:ext uri="{FF2B5EF4-FFF2-40B4-BE49-F238E27FC236}">
-                <a16:creationId xmlns:a16="http://schemas.microsoft.com/office/drawing/2014/main" id="{80DFCD15-36F6-421C-B428-71B79CCBAD70}"/>
-              </a:ext>
-            </a:extLst>
-          </p:cNvPr>
+            <a:endParaRPr lang="en-US" dirty="0"/>
+          </a:p>
+        </p:txBody>
+      </p:sp>
+      <p:sp>
+        <p:nvSpPr>
+          <p:cNvPr id="3" name="Text Placeholder 2"/>
           <p:cNvSpPr>
             <a:spLocks noGrp="1"/>
           </p:cNvSpPr>
@@ -2834,8 +2818,8 @@
         </p:nvSpPr>
         <p:spPr>
           <a:xfrm>
-            <a:off x="838200" y="1825625"/>
-            <a:ext cx="10515600" cy="4351338"/>
+            <a:off x="618718" y="575157"/>
+            <a:ext cx="7762102" cy="1370873"/>
           </a:xfrm>
           <a:prstGeom prst="rect">
             <a:avLst/>
@@ -2880,19 +2864,13 @@
               <a:rPr lang="en-US"/>
               <a:t>Fifth level</a:t>
             </a:r>
-            <a:endParaRPr lang="nl-NL"/>
-          </a:p>
-        </p:txBody>
-      </p:sp>
-      <p:sp>
-        <p:nvSpPr>
-          <p:cNvPr id="4" name="Date Placeholder 3">
-            <a:extLst>
-              <a:ext uri="{FF2B5EF4-FFF2-40B4-BE49-F238E27FC236}">
-                <a16:creationId xmlns:a16="http://schemas.microsoft.com/office/drawing/2014/main" id="{C7EC9470-1086-BEC4-21C1-E67845DD377E}"/>
-              </a:ext>
-            </a:extLst>
-          </p:cNvPr>
+            <a:endParaRPr lang="en-US" dirty="0"/>
+          </a:p>
+        </p:txBody>
+      </p:sp>
+      <p:sp>
+        <p:nvSpPr>
+          <p:cNvPr id="4" name="Date Placeholder 3"/>
           <p:cNvSpPr>
             <a:spLocks noGrp="1"/>
           </p:cNvSpPr>
@@ -2902,8 +2880,8 @@
         </p:nvSpPr>
         <p:spPr>
           <a:xfrm>
-            <a:off x="838200" y="6356350"/>
-            <a:ext cx="2743200" cy="365125"/>
+            <a:off x="618718" y="2002545"/>
+            <a:ext cx="2024896" cy="115031"/>
           </a:xfrm>
           <a:prstGeom prst="rect">
             <a:avLst/>
@@ -2913,7 +2891,7 @@
           <a:bodyPr vert="horz" lIns="91440" tIns="45720" rIns="91440" bIns="45720" rtlCol="0" anchor="ctr"/>
           <a:lstStyle>
             <a:lvl1pPr algn="l">
-              <a:defRPr sz="1200">
+              <a:defRPr sz="378">
                 <a:solidFill>
                   <a:schemeClr val="tx1">
                     <a:tint val="75000"/>
@@ -2933,13 +2911,7 @@
       </p:sp>
       <p:sp>
         <p:nvSpPr>
-          <p:cNvPr id="5" name="Footer Placeholder 4">
-            <a:extLst>
-              <a:ext uri="{FF2B5EF4-FFF2-40B4-BE49-F238E27FC236}">
-                <a16:creationId xmlns:a16="http://schemas.microsoft.com/office/drawing/2014/main" id="{0E67618F-E3AE-AC00-0275-67B6F07BC27D}"/>
-              </a:ext>
-            </a:extLst>
-          </p:cNvPr>
+          <p:cNvPr id="5" name="Footer Placeholder 4"/>
           <p:cNvSpPr>
             <a:spLocks noGrp="1"/>
           </p:cNvSpPr>
@@ -2949,8 +2921,8 @@
         </p:nvSpPr>
         <p:spPr>
           <a:xfrm>
-            <a:off x="4038600" y="6356350"/>
-            <a:ext cx="4114800" cy="365125"/>
+            <a:off x="2981097" y="2002545"/>
+            <a:ext cx="3037344" cy="115031"/>
           </a:xfrm>
           <a:prstGeom prst="rect">
             <a:avLst/>
@@ -2960,7 +2932,7 @@
           <a:bodyPr vert="horz" lIns="91440" tIns="45720" rIns="91440" bIns="45720" rtlCol="0" anchor="ctr"/>
           <a:lstStyle>
             <a:lvl1pPr algn="ctr">
-              <a:defRPr sz="1200">
+              <a:defRPr sz="378">
                 <a:solidFill>
                   <a:schemeClr val="tx1">
                     <a:tint val="75000"/>
@@ -2976,13 +2948,7 @@
       </p:sp>
       <p:sp>
         <p:nvSpPr>
-          <p:cNvPr id="6" name="Slide Number Placeholder 5">
-            <a:extLst>
-              <a:ext uri="{FF2B5EF4-FFF2-40B4-BE49-F238E27FC236}">
-                <a16:creationId xmlns:a16="http://schemas.microsoft.com/office/drawing/2014/main" id="{29CB3E44-F4E6-8E96-2EDE-1E3DCD75BD49}"/>
-              </a:ext>
-            </a:extLst>
-          </p:cNvPr>
+          <p:cNvPr id="6" name="Slide Number Placeholder 5"/>
           <p:cNvSpPr>
             <a:spLocks noGrp="1"/>
           </p:cNvSpPr>
@@ -2992,8 +2958,8 @@
         </p:nvSpPr>
         <p:spPr>
           <a:xfrm>
-            <a:off x="8610600" y="6356350"/>
-            <a:ext cx="2743200" cy="365125"/>
+            <a:off x="6355924" y="2002545"/>
+            <a:ext cx="2024896" cy="115031"/>
           </a:xfrm>
           <a:prstGeom prst="rect">
             <a:avLst/>
@@ -3003,7 +2969,7 @@
           <a:bodyPr vert="horz" lIns="91440" tIns="45720" rIns="91440" bIns="45720" rtlCol="0" anchor="ctr"/>
           <a:lstStyle>
             <a:lvl1pPr algn="r">
-              <a:defRPr sz="1200">
+              <a:defRPr sz="378">
                 <a:solidFill>
                   <a:schemeClr val="tx1">
                     <a:tint val="75000"/>
@@ -3024,27 +2990,27 @@
     </p:spTree>
     <p:extLst>
       <p:ext uri="{BB962C8B-B14F-4D97-AF65-F5344CB8AC3E}">
-        <p14:creationId xmlns:p14="http://schemas.microsoft.com/office/powerpoint/2010/main" val="1084315942"/>
+        <p14:creationId xmlns:p14="http://schemas.microsoft.com/office/powerpoint/2010/main" val="2539760024"/>
       </p:ext>
     </p:extLst>
   </p:cSld>
   <p:clrMap bg1="lt1" tx1="dk1" bg2="lt2" tx2="dk2" accent1="accent1" accent2="accent2" accent3="accent3" accent4="accent4" accent5="accent5" accent6="accent6" hlink="hlink" folHlink="folHlink"/>
   <p:sldLayoutIdLst>
-    <p:sldLayoutId id="2147483649" r:id="rId1"/>
-    <p:sldLayoutId id="2147483650" r:id="rId2"/>
-    <p:sldLayoutId id="2147483651" r:id="rId3"/>
-    <p:sldLayoutId id="2147483652" r:id="rId4"/>
-    <p:sldLayoutId id="2147483653" r:id="rId5"/>
-    <p:sldLayoutId id="2147483654" r:id="rId6"/>
-    <p:sldLayoutId id="2147483655" r:id="rId7"/>
-    <p:sldLayoutId id="2147483656" r:id="rId8"/>
-    <p:sldLayoutId id="2147483657" r:id="rId9"/>
-    <p:sldLayoutId id="2147483658" r:id="rId10"/>
-    <p:sldLayoutId id="2147483659" r:id="rId11"/>
+    <p:sldLayoutId id="2147483673" r:id="rId1"/>
+    <p:sldLayoutId id="2147483674" r:id="rId2"/>
+    <p:sldLayoutId id="2147483675" r:id="rId3"/>
+    <p:sldLayoutId id="2147483676" r:id="rId4"/>
+    <p:sldLayoutId id="2147483677" r:id="rId5"/>
+    <p:sldLayoutId id="2147483678" r:id="rId6"/>
+    <p:sldLayoutId id="2147483679" r:id="rId7"/>
+    <p:sldLayoutId id="2147483680" r:id="rId8"/>
+    <p:sldLayoutId id="2147483681" r:id="rId9"/>
+    <p:sldLayoutId id="2147483682" r:id="rId10"/>
+    <p:sldLayoutId id="2147483683" r:id="rId11"/>
   </p:sldLayoutIdLst>
   <p:txStyles>
     <p:titleStyle>
-      <a:lvl1pPr algn="l" defTabSz="914400" rtl="0" eaLnBrk="1" latinLnBrk="0" hangingPunct="1">
+      <a:lvl1pPr algn="l" defTabSz="288036" rtl="0" eaLnBrk="1" latinLnBrk="0" hangingPunct="1">
         <a:lnSpc>
           <a:spcPct val="90000"/>
         </a:lnSpc>
@@ -3052,7 +3018,7 @@
           <a:spcPct val="0"/>
         </a:spcBef>
         <a:buNone/>
-        <a:defRPr sz="4400" kern="1200">
+        <a:defRPr sz="1386" kern="1200">
           <a:solidFill>
             <a:schemeClr val="tx1"/>
           </a:solidFill>
@@ -3063,16 +3029,16 @@
       </a:lvl1pPr>
     </p:titleStyle>
     <p:bodyStyle>
-      <a:lvl1pPr marL="228600" indent="-228600" algn="l" defTabSz="914400" rtl="0" eaLnBrk="1" latinLnBrk="0" hangingPunct="1">
+      <a:lvl1pPr marL="72009" indent="-72009" algn="l" defTabSz="288036" rtl="0" eaLnBrk="1" latinLnBrk="0" hangingPunct="1">
         <a:lnSpc>
           <a:spcPct val="90000"/>
         </a:lnSpc>
         <a:spcBef>
-          <a:spcPts val="1000"/>
+          <a:spcPts val="315"/>
         </a:spcBef>
         <a:buFont typeface="Arial" panose="020B0604020202020204" pitchFamily="34" charset="0"/>
         <a:buChar char="•"/>
-        <a:defRPr sz="2800" kern="1200">
+        <a:defRPr sz="882" kern="1200">
           <a:solidFill>
             <a:schemeClr val="tx1"/>
           </a:solidFill>
@@ -3081,16 +3047,16 @@
           <a:cs typeface="+mn-cs"/>
         </a:defRPr>
       </a:lvl1pPr>
-      <a:lvl2pPr marL="685800" indent="-228600" algn="l" defTabSz="914400" rtl="0" eaLnBrk="1" latinLnBrk="0" hangingPunct="1">
+      <a:lvl2pPr marL="216027" indent="-72009" algn="l" defTabSz="288036" rtl="0" eaLnBrk="1" latinLnBrk="0" hangingPunct="1">
         <a:lnSpc>
           <a:spcPct val="90000"/>
         </a:lnSpc>
         <a:spcBef>
-          <a:spcPts val="500"/>
+          <a:spcPts val="158"/>
         </a:spcBef>
         <a:buFont typeface="Arial" panose="020B0604020202020204" pitchFamily="34" charset="0"/>
         <a:buChar char="•"/>
-        <a:defRPr sz="2400" kern="1200">
+        <a:defRPr sz="756" kern="1200">
           <a:solidFill>
             <a:schemeClr val="tx1"/>
           </a:solidFill>
@@ -3099,16 +3065,16 @@
           <a:cs typeface="+mn-cs"/>
         </a:defRPr>
       </a:lvl2pPr>
-      <a:lvl3pPr marL="1143000" indent="-228600" algn="l" defTabSz="914400" rtl="0" eaLnBrk="1" latinLnBrk="0" hangingPunct="1">
+      <a:lvl3pPr marL="360045" indent="-72009" algn="l" defTabSz="288036" rtl="0" eaLnBrk="1" latinLnBrk="0" hangingPunct="1">
         <a:lnSpc>
           <a:spcPct val="90000"/>
         </a:lnSpc>
         <a:spcBef>
-          <a:spcPts val="500"/>
+          <a:spcPts val="158"/>
         </a:spcBef>
         <a:buFont typeface="Arial" panose="020B0604020202020204" pitchFamily="34" charset="0"/>
         <a:buChar char="•"/>
-        <a:defRPr sz="2000" kern="1200">
+        <a:defRPr sz="630" kern="1200">
           <a:solidFill>
             <a:schemeClr val="tx1"/>
           </a:solidFill>
@@ -3117,16 +3083,16 @@
           <a:cs typeface="+mn-cs"/>
         </a:defRPr>
       </a:lvl3pPr>
-      <a:lvl4pPr marL="1600200" indent="-228600" algn="l" defTabSz="914400" rtl="0" eaLnBrk="1" latinLnBrk="0" hangingPunct="1">
+      <a:lvl4pPr marL="504063" indent="-72009" algn="l" defTabSz="288036" rtl="0" eaLnBrk="1" latinLnBrk="0" hangingPunct="1">
         <a:lnSpc>
           <a:spcPct val="90000"/>
         </a:lnSpc>
         <a:spcBef>
-          <a:spcPts val="500"/>
+          <a:spcPts val="158"/>
         </a:spcBef>
         <a:buFont typeface="Arial" panose="020B0604020202020204" pitchFamily="34" charset="0"/>
         <a:buChar char="•"/>
-        <a:defRPr sz="1800" kern="1200">
+        <a:defRPr sz="567" kern="1200">
           <a:solidFill>
             <a:schemeClr val="tx1"/>
           </a:solidFill>
@@ -3135,16 +3101,16 @@
           <a:cs typeface="+mn-cs"/>
         </a:defRPr>
       </a:lvl4pPr>
-      <a:lvl5pPr marL="2057400" indent="-228600" algn="l" defTabSz="914400" rtl="0" eaLnBrk="1" latinLnBrk="0" hangingPunct="1">
+      <a:lvl5pPr marL="648081" indent="-72009" algn="l" defTabSz="288036" rtl="0" eaLnBrk="1" latinLnBrk="0" hangingPunct="1">
         <a:lnSpc>
           <a:spcPct val="90000"/>
         </a:lnSpc>
         <a:spcBef>
-          <a:spcPts val="500"/>
+          <a:spcPts val="158"/>
         </a:spcBef>
         <a:buFont typeface="Arial" panose="020B0604020202020204" pitchFamily="34" charset="0"/>
         <a:buChar char="•"/>
-        <a:defRPr sz="1800" kern="1200">
+        <a:defRPr sz="567" kern="1200">
           <a:solidFill>
             <a:schemeClr val="tx1"/>
           </a:solidFill>
@@ -3153,16 +3119,16 @@
           <a:cs typeface="+mn-cs"/>
         </a:defRPr>
       </a:lvl5pPr>
-      <a:lvl6pPr marL="2514600" indent="-228600" algn="l" defTabSz="914400" rtl="0" eaLnBrk="1" latinLnBrk="0" hangingPunct="1">
+      <a:lvl6pPr marL="792099" indent="-72009" algn="l" defTabSz="288036" rtl="0" eaLnBrk="1" latinLnBrk="0" hangingPunct="1">
         <a:lnSpc>
           <a:spcPct val="90000"/>
         </a:lnSpc>
         <a:spcBef>
-          <a:spcPts val="500"/>
+          <a:spcPts val="158"/>
         </a:spcBef>
         <a:buFont typeface="Arial" panose="020B0604020202020204" pitchFamily="34" charset="0"/>
         <a:buChar char="•"/>
-        <a:defRPr sz="1800" kern="1200">
+        <a:defRPr sz="567" kern="1200">
           <a:solidFill>
             <a:schemeClr val="tx1"/>
           </a:solidFill>
@@ -3171,16 +3137,16 @@
           <a:cs typeface="+mn-cs"/>
         </a:defRPr>
       </a:lvl6pPr>
-      <a:lvl7pPr marL="2971800" indent="-228600" algn="l" defTabSz="914400" rtl="0" eaLnBrk="1" latinLnBrk="0" hangingPunct="1">
+      <a:lvl7pPr marL="936117" indent="-72009" algn="l" defTabSz="288036" rtl="0" eaLnBrk="1" latinLnBrk="0" hangingPunct="1">
         <a:lnSpc>
           <a:spcPct val="90000"/>
         </a:lnSpc>
         <a:spcBef>
-          <a:spcPts val="500"/>
+          <a:spcPts val="158"/>
         </a:spcBef>
         <a:buFont typeface="Arial" panose="020B0604020202020204" pitchFamily="34" charset="0"/>
         <a:buChar char="•"/>
-        <a:defRPr sz="1800" kern="1200">
+        <a:defRPr sz="567" kern="1200">
           <a:solidFill>
             <a:schemeClr val="tx1"/>
           </a:solidFill>
@@ -3189,16 +3155,16 @@
           <a:cs typeface="+mn-cs"/>
         </a:defRPr>
       </a:lvl7pPr>
-      <a:lvl8pPr marL="3429000" indent="-228600" algn="l" defTabSz="914400" rtl="0" eaLnBrk="1" latinLnBrk="0" hangingPunct="1">
+      <a:lvl8pPr marL="1080135" indent="-72009" algn="l" defTabSz="288036" rtl="0" eaLnBrk="1" latinLnBrk="0" hangingPunct="1">
         <a:lnSpc>
           <a:spcPct val="90000"/>
         </a:lnSpc>
         <a:spcBef>
-          <a:spcPts val="500"/>
+          <a:spcPts val="158"/>
         </a:spcBef>
         <a:buFont typeface="Arial" panose="020B0604020202020204" pitchFamily="34" charset="0"/>
         <a:buChar char="•"/>
-        <a:defRPr sz="1800" kern="1200">
+        <a:defRPr sz="567" kern="1200">
           <a:solidFill>
             <a:schemeClr val="tx1"/>
           </a:solidFill>
@@ -3207,16 +3173,16 @@
           <a:cs typeface="+mn-cs"/>
         </a:defRPr>
       </a:lvl8pPr>
-      <a:lvl9pPr marL="3886200" indent="-228600" algn="l" defTabSz="914400" rtl="0" eaLnBrk="1" latinLnBrk="0" hangingPunct="1">
+      <a:lvl9pPr marL="1224153" indent="-72009" algn="l" defTabSz="288036" rtl="0" eaLnBrk="1" latinLnBrk="0" hangingPunct="1">
         <a:lnSpc>
           <a:spcPct val="90000"/>
         </a:lnSpc>
         <a:spcBef>
-          <a:spcPts val="500"/>
+          <a:spcPts val="158"/>
         </a:spcBef>
         <a:buFont typeface="Arial" panose="020B0604020202020204" pitchFamily="34" charset="0"/>
         <a:buChar char="•"/>
-        <a:defRPr sz="1800" kern="1200">
+        <a:defRPr sz="567" kern="1200">
           <a:solidFill>
             <a:schemeClr val="tx1"/>
           </a:solidFill>
@@ -3228,10 +3194,10 @@
     </p:bodyStyle>
     <p:otherStyle>
       <a:defPPr>
-        <a:defRPr lang="nl-NL"/>
+        <a:defRPr lang="en-US"/>
       </a:defPPr>
-      <a:lvl1pPr marL="0" algn="l" defTabSz="914400" rtl="0" eaLnBrk="1" latinLnBrk="0" hangingPunct="1">
-        <a:defRPr sz="1800" kern="1200">
+      <a:lvl1pPr marL="0" algn="l" defTabSz="288036" rtl="0" eaLnBrk="1" latinLnBrk="0" hangingPunct="1">
+        <a:defRPr sz="567" kern="1200">
           <a:solidFill>
             <a:schemeClr val="tx1"/>
           </a:solidFill>
@@ -3240,8 +3206,8 @@
           <a:cs typeface="+mn-cs"/>
         </a:defRPr>
       </a:lvl1pPr>
-      <a:lvl2pPr marL="457200" algn="l" defTabSz="914400" rtl="0" eaLnBrk="1" latinLnBrk="0" hangingPunct="1">
-        <a:defRPr sz="1800" kern="1200">
+      <a:lvl2pPr marL="144018" algn="l" defTabSz="288036" rtl="0" eaLnBrk="1" latinLnBrk="0" hangingPunct="1">
+        <a:defRPr sz="567" kern="1200">
           <a:solidFill>
             <a:schemeClr val="tx1"/>
           </a:solidFill>
@@ -3250,8 +3216,8 @@
           <a:cs typeface="+mn-cs"/>
         </a:defRPr>
       </a:lvl2pPr>
-      <a:lvl3pPr marL="914400" algn="l" defTabSz="914400" rtl="0" eaLnBrk="1" latinLnBrk="0" hangingPunct="1">
-        <a:defRPr sz="1800" kern="1200">
+      <a:lvl3pPr marL="288036" algn="l" defTabSz="288036" rtl="0" eaLnBrk="1" latinLnBrk="0" hangingPunct="1">
+        <a:defRPr sz="567" kern="1200">
           <a:solidFill>
             <a:schemeClr val="tx1"/>
           </a:solidFill>
@@ -3260,8 +3226,8 @@
           <a:cs typeface="+mn-cs"/>
         </a:defRPr>
       </a:lvl3pPr>
-      <a:lvl4pPr marL="1371600" algn="l" defTabSz="914400" rtl="0" eaLnBrk="1" latinLnBrk="0" hangingPunct="1">
-        <a:defRPr sz="1800" kern="1200">
+      <a:lvl4pPr marL="432054" algn="l" defTabSz="288036" rtl="0" eaLnBrk="1" latinLnBrk="0" hangingPunct="1">
+        <a:defRPr sz="567" kern="1200">
           <a:solidFill>
             <a:schemeClr val="tx1"/>
           </a:solidFill>
@@ -3270,8 +3236,8 @@
           <a:cs typeface="+mn-cs"/>
         </a:defRPr>
       </a:lvl4pPr>
-      <a:lvl5pPr marL="1828800" algn="l" defTabSz="914400" rtl="0" eaLnBrk="1" latinLnBrk="0" hangingPunct="1">
-        <a:defRPr sz="1800" kern="1200">
+      <a:lvl5pPr marL="576072" algn="l" defTabSz="288036" rtl="0" eaLnBrk="1" latinLnBrk="0" hangingPunct="1">
+        <a:defRPr sz="567" kern="1200">
           <a:solidFill>
             <a:schemeClr val="tx1"/>
           </a:solidFill>
@@ -3280,8 +3246,8 @@
           <a:cs typeface="+mn-cs"/>
         </a:defRPr>
       </a:lvl5pPr>
-      <a:lvl6pPr marL="2286000" algn="l" defTabSz="914400" rtl="0" eaLnBrk="1" latinLnBrk="0" hangingPunct="1">
-        <a:defRPr sz="1800" kern="1200">
+      <a:lvl6pPr marL="720090" algn="l" defTabSz="288036" rtl="0" eaLnBrk="1" latinLnBrk="0" hangingPunct="1">
+        <a:defRPr sz="567" kern="1200">
           <a:solidFill>
             <a:schemeClr val="tx1"/>
           </a:solidFill>
@@ -3290,8 +3256,8 @@
           <a:cs typeface="+mn-cs"/>
         </a:defRPr>
       </a:lvl6pPr>
-      <a:lvl7pPr marL="2743200" algn="l" defTabSz="914400" rtl="0" eaLnBrk="1" latinLnBrk="0" hangingPunct="1">
-        <a:defRPr sz="1800" kern="1200">
+      <a:lvl7pPr marL="864108" algn="l" defTabSz="288036" rtl="0" eaLnBrk="1" latinLnBrk="0" hangingPunct="1">
+        <a:defRPr sz="567" kern="1200">
           <a:solidFill>
             <a:schemeClr val="tx1"/>
           </a:solidFill>
@@ -3300,8 +3266,8 @@
           <a:cs typeface="+mn-cs"/>
         </a:defRPr>
       </a:lvl7pPr>
-      <a:lvl8pPr marL="3200400" algn="l" defTabSz="914400" rtl="0" eaLnBrk="1" latinLnBrk="0" hangingPunct="1">
-        <a:defRPr sz="1800" kern="1200">
+      <a:lvl8pPr marL="1008126" algn="l" defTabSz="288036" rtl="0" eaLnBrk="1" latinLnBrk="0" hangingPunct="1">
+        <a:defRPr sz="567" kern="1200">
           <a:solidFill>
             <a:schemeClr val="tx1"/>
           </a:solidFill>
@@ -3310,8 +3276,8 @@
           <a:cs typeface="+mn-cs"/>
         </a:defRPr>
       </a:lvl8pPr>
-      <a:lvl9pPr marL="3657600" algn="l" defTabSz="914400" rtl="0" eaLnBrk="1" latinLnBrk="0" hangingPunct="1">
-        <a:defRPr sz="1800" kern="1200">
+      <a:lvl9pPr marL="1152144" algn="l" defTabSz="288036" rtl="0" eaLnBrk="1" latinLnBrk="0" hangingPunct="1">
+        <a:defRPr sz="567" kern="1200">
           <a:solidFill>
             <a:schemeClr val="tx1"/>
           </a:solidFill>
@@ -3356,8 +3322,8 @@
         </p:nvSpPr>
         <p:spPr>
           <a:xfrm>
-            <a:off x="2061166" y="2844225"/>
-            <a:ext cx="2161860" cy="584775"/>
+            <a:off x="477999" y="787904"/>
+            <a:ext cx="2161859" cy="584775"/>
           </a:xfrm>
           <a:prstGeom prst="rect">
             <a:avLst/>
@@ -3398,8 +3364,8 @@
         </p:nvSpPr>
         <p:spPr>
           <a:xfrm>
-            <a:off x="4223026" y="3021555"/>
-            <a:ext cx="704911" cy="230114"/>
+            <a:off x="2639862" y="965233"/>
+            <a:ext cx="704910" cy="230114"/>
           </a:xfrm>
           <a:prstGeom prst="rightArrow">
             <a:avLst>
@@ -3429,7 +3395,7 @@
           <a:lstStyle/>
           <a:p>
             <a:pPr algn="ctr"/>
-            <a:endParaRPr lang="nl-NL" dirty="0"/>
+            <a:endParaRPr lang="nl-NL" sz="1192" dirty="0"/>
           </a:p>
         </p:txBody>
       </p:sp>
@@ -3447,8 +3413,8 @@
         </p:nvSpPr>
         <p:spPr>
           <a:xfrm>
-            <a:off x="4927937" y="2844225"/>
-            <a:ext cx="2184063" cy="584775"/>
+            <a:off x="3344770" y="787906"/>
+            <a:ext cx="2184065" cy="584775"/>
           </a:xfrm>
           <a:prstGeom prst="rect">
             <a:avLst/>
@@ -3489,8 +3455,8 @@
         </p:nvSpPr>
         <p:spPr>
           <a:xfrm>
-            <a:off x="7830161" y="2844225"/>
-            <a:ext cx="2206266" cy="584775"/>
+            <a:off x="6246995" y="787904"/>
+            <a:ext cx="2206267" cy="584775"/>
           </a:xfrm>
           <a:prstGeom prst="rect">
             <a:avLst/>
@@ -3531,8 +3497,8 @@
         </p:nvSpPr>
         <p:spPr>
           <a:xfrm>
-            <a:off x="7118625" y="3026300"/>
-            <a:ext cx="704911" cy="230114"/>
+            <a:off x="5535458" y="969976"/>
+            <a:ext cx="704910" cy="230114"/>
           </a:xfrm>
           <a:prstGeom prst="rightArrow">
             <a:avLst>
@@ -3562,7 +3528,7 @@
           <a:lstStyle/>
           <a:p>
             <a:pPr algn="ctr"/>
-            <a:endParaRPr lang="nl-NL" dirty="0"/>
+            <a:endParaRPr lang="nl-NL" sz="1192" dirty="0"/>
           </a:p>
         </p:txBody>
       </p:sp>
@@ -3582,7 +3548,7 @@
 <file path=ppt/theme/theme1.xml><?xml version="1.0" encoding="utf-8"?>
 <a:theme xmlns:a="http://schemas.openxmlformats.org/drawingml/2006/main" name="Office Theme">
   <a:themeElements>
-    <a:clrScheme name="Office">
+    <a:clrScheme name="Office Theme">
       <a:dk1>
         <a:sysClr val="windowText" lastClr="000000"/>
       </a:dk1>
@@ -3620,7 +3586,7 @@
         <a:srgbClr val="954F72"/>
       </a:folHlink>
     </a:clrScheme>
-    <a:fontScheme name="Office">
+    <a:fontScheme name="Office Theme">
       <a:majorFont>
         <a:latin typeface="Calibri Light" panose="020F0302020204030204"/>
         <a:ea typeface=""/>
@@ -3655,23 +3621,6 @@
         <a:font script="Viet" typeface="Times New Roman"/>
         <a:font script="Uigh" typeface="Microsoft Uighur"/>
         <a:font script="Geor" typeface="Sylfaen"/>
-        <a:font script="Armn" typeface="Arial"/>
-        <a:font script="Bugi" typeface="Leelawadee UI"/>
-        <a:font script="Bopo" typeface="Microsoft JhengHei"/>
-        <a:font script="Java" typeface="Javanese Text"/>
-        <a:font script="Lisu" typeface="Segoe UI"/>
-        <a:font script="Mymr" typeface="Myanmar Text"/>
-        <a:font script="Nkoo" typeface="Ebrima"/>
-        <a:font script="Olck" typeface="Nirmala UI"/>
-        <a:font script="Osma" typeface="Ebrima"/>
-        <a:font script="Phag" typeface="Phagspa"/>
-        <a:font script="Syrn" typeface="Estrangelo Edessa"/>
-        <a:font script="Syrj" typeface="Estrangelo Edessa"/>
-        <a:font script="Syre" typeface="Estrangelo Edessa"/>
-        <a:font script="Sora" typeface="Nirmala UI"/>
-        <a:font script="Tale" typeface="Microsoft Tai Le"/>
-        <a:font script="Talu" typeface="Microsoft New Tai Lue"/>
-        <a:font script="Tfng" typeface="Ebrima"/>
       </a:majorFont>
       <a:minorFont>
         <a:latin typeface="Calibri" panose="020F0502020204030204"/>
@@ -3707,26 +3656,9 @@
         <a:font script="Viet" typeface="Arial"/>
         <a:font script="Uigh" typeface="Microsoft Uighur"/>
         <a:font script="Geor" typeface="Sylfaen"/>
-        <a:font script="Armn" typeface="Arial"/>
-        <a:font script="Bugi" typeface="Leelawadee UI"/>
-        <a:font script="Bopo" typeface="Microsoft JhengHei"/>
-        <a:font script="Java" typeface="Javanese Text"/>
-        <a:font script="Lisu" typeface="Segoe UI"/>
-        <a:font script="Mymr" typeface="Myanmar Text"/>
-        <a:font script="Nkoo" typeface="Ebrima"/>
-        <a:font script="Olck" typeface="Nirmala UI"/>
-        <a:font script="Osma" typeface="Ebrima"/>
-        <a:font script="Phag" typeface="Phagspa"/>
-        <a:font script="Syrn" typeface="Estrangelo Edessa"/>
-        <a:font script="Syrj" typeface="Estrangelo Edessa"/>
-        <a:font script="Syre" typeface="Estrangelo Edessa"/>
-        <a:font script="Sora" typeface="Nirmala UI"/>
-        <a:font script="Tale" typeface="Microsoft Tai Le"/>
-        <a:font script="Talu" typeface="Microsoft New Tai Lue"/>
-        <a:font script="Tfng" typeface="Ebrima"/>
       </a:minorFont>
     </a:fontScheme>
-    <a:fmtScheme name="Office">
+    <a:fmtScheme name="Office Theme">
       <a:fillStyleLst>
         <a:solidFill>
           <a:schemeClr val="phClr"/>
@@ -3868,7 +3800,7 @@
   <a:extraClrSchemeLst/>
   <a:extLst>
     <a:ext uri="{05A4C25C-085E-4340-85A3-A5531E510DB2}">
-      <thm15:themeFamily xmlns:thm15="http://schemas.microsoft.com/office/thememl/2012/main" name="Office Theme" id="{62F939B6-93AF-4DB8-9C6B-D6C7DFDC589F}" vid="{4A3C46E8-61CC-4603-A589-7422A47A8E4A}"/>
+      <thm15:themeFamily xmlns:thm15="http://schemas.microsoft.com/office/thememl/2012/main" name="Office Theme 2013 - 2022" id="{62F939B6-93AF-4DB8-9C6B-D6C7DFDC589F}" vid="{4A3C46E8-61CC-4603-A589-7422A47A8E4A}"/>
     </a:ext>
   </a:extLst>
 </a:theme>

</xml_diff>